<commit_message>
prep for lecture 1
</commit_message>
<xml_diff>
--- a/Lectures/Byte1.pptx
+++ b/Lectures/Byte1.pptx
@@ -5,27 +5,19 @@
     <p:sldMasterId id="2147483648" r:id="rId1"/>
   </p:sldMasterIdLst>
   <p:notesMasterIdLst>
-    <p:notesMasterId r:id="rId17"/>
+    <p:notesMasterId r:id="rId9"/>
   </p:notesMasterIdLst>
   <p:handoutMasterIdLst>
-    <p:handoutMasterId r:id="rId18"/>
+    <p:handoutMasterId r:id="rId10"/>
   </p:handoutMasterIdLst>
   <p:sldIdLst>
     <p:sldId id="256" r:id="rId2"/>
     <p:sldId id="302" r:id="rId3"/>
-    <p:sldId id="303" r:id="rId4"/>
-    <p:sldId id="314" r:id="rId5"/>
-    <p:sldId id="316" r:id="rId6"/>
-    <p:sldId id="304" r:id="rId7"/>
-    <p:sldId id="305" r:id="rId8"/>
-    <p:sldId id="306" r:id="rId9"/>
-    <p:sldId id="307" r:id="rId10"/>
-    <p:sldId id="308" r:id="rId11"/>
-    <p:sldId id="309" r:id="rId12"/>
-    <p:sldId id="310" r:id="rId13"/>
-    <p:sldId id="311" r:id="rId14"/>
-    <p:sldId id="312" r:id="rId15"/>
-    <p:sldId id="313" r:id="rId16"/>
+    <p:sldId id="315" r:id="rId4"/>
+    <p:sldId id="316" r:id="rId5"/>
+    <p:sldId id="304" r:id="rId6"/>
+    <p:sldId id="305" r:id="rId7"/>
+    <p:sldId id="313" r:id="rId8"/>
   </p:sldIdLst>
   <p:sldSz cx="9144000" cy="6858000" type="screen4x3"/>
   <p:notesSz cx="6858000" cy="9144000"/>
@@ -209,7 +201,7 @@
           <a:p>
             <a:fld id="{D3AAB66F-B1B7-D045-B4E8-4F60236F228D}" type="datetimeFigureOut">
               <a:rPr lang="en-US" smtClean="0"/>
-              <a:t>1/13/15</a:t>
+              <a:t>1/9/16</a:t>
             </a:fld>
             <a:endParaRPr lang="en-US"/>
           </a:p>
@@ -375,7 +367,7 @@
           <a:p>
             <a:fld id="{BCCF8E76-06A6-164E-A6FA-EC32C13EB232}" type="datetimeFigureOut">
               <a:rPr lang="en-US" smtClean="0"/>
-              <a:t>1/13/15</a:t>
+              <a:t>1/9/16</a:t>
             </a:fld>
             <a:endParaRPr lang="en-US"/>
           </a:p>
@@ -688,10 +680,6 @@
           <a:bodyPr/>
           <a:lstStyle/>
           <a:p>
-            <a:r>
-              <a:rPr lang="en-US" dirty="0" smtClean="0"/>
-              <a:t>Meanwhile</a:t>
-            </a:r>
             <a:endParaRPr lang="en-US" dirty="0"/>
           </a:p>
         </p:txBody>
@@ -713,7 +701,7 @@
           <a:p>
             <a:fld id="{FD66F34B-9C4D-8640-BB34-4C24A79C9FFB}" type="slidenum">
               <a:rPr lang="en-US" smtClean="0"/>
-              <a:t>11</a:t>
+              <a:t>1</a:t>
             </a:fld>
             <a:endParaRPr lang="en-US"/>
           </a:p>
@@ -722,7 +710,7 @@
     </p:spTree>
     <p:extLst>
       <p:ext uri="{BB962C8B-B14F-4D97-AF65-F5344CB8AC3E}">
-        <p14:creationId xmlns:p14="http://schemas.microsoft.com/office/powerpoint/2010/main" val="4188514958"/>
+        <p14:creationId xmlns:p14="http://schemas.microsoft.com/office/powerpoint/2010/main" val="3695850487"/>
       </p:ext>
     </p:extLst>
   </p:cSld>
@@ -823,7 +811,7 @@
           <a:p>
             <a:fld id="{FD66F34B-9C4D-8640-BB34-4C24A79C9FFB}" type="slidenum">
               <a:rPr lang="en-US" smtClean="0"/>
-              <a:t>15</a:t>
+              <a:t>7</a:t>
             </a:fld>
             <a:endParaRPr lang="en-US"/>
           </a:p>
@@ -1359,7 +1347,7 @@
             <a:fld id="{FA3C144B-2939-9A49-B014-915EC3E81866}" type="datetime1">
               <a:rPr lang="en-US" smtClean="0"/>
               <a:pPr/>
-              <a:t>1/13/15</a:t>
+              <a:t>1/9/16</a:t>
             </a:fld>
             <a:endParaRPr lang="en-US" dirty="0"/>
           </a:p>
@@ -1788,7 +1776,7 @@
           <a:p>
             <a:fld id="{76838339-A875-5E45-AB3F-AAABD270346A}" type="datetime1">
               <a:rPr lang="en-US" smtClean="0"/>
-              <a:t>1/13/15</a:t>
+              <a:t>1/9/16</a:t>
             </a:fld>
             <a:endParaRPr lang="en-US"/>
           </a:p>
@@ -2074,7 +2062,7 @@
             <a:fld id="{FA3C144B-2939-9A49-B014-915EC3E81866}" type="datetime1">
               <a:rPr lang="en-US" smtClean="0"/>
               <a:pPr/>
-              <a:t>1/13/15</a:t>
+              <a:t>1/9/16</a:t>
             </a:fld>
             <a:endParaRPr lang="en-US" dirty="0"/>
           </a:p>
@@ -2556,7 +2544,7 @@
           <a:p>
             <a:fld id="{A73F672F-A5FB-5745-934A-1BF51CA5539C}" type="datetime1">
               <a:rPr lang="en-US" smtClean="0"/>
-              <a:t>1/13/15</a:t>
+              <a:t>1/9/16</a:t>
             </a:fld>
             <a:endParaRPr lang="en-US"/>
           </a:p>
@@ -2898,7 +2886,7 @@
             <a:fld id="{FA3C144B-2939-9A49-B014-915EC3E81866}" type="datetime1">
               <a:rPr lang="en-US" smtClean="0"/>
               <a:pPr/>
-              <a:t>1/13/15</a:t>
+              <a:t>1/9/16</a:t>
             </a:fld>
             <a:endParaRPr lang="en-US" dirty="0"/>
           </a:p>
@@ -3362,7 +3350,7 @@
           <a:p>
             <a:fld id="{6AFE6A63-5EBE-3E48-B0AE-DF655A1ECE76}" type="datetime1">
               <a:rPr lang="en-US" smtClean="0"/>
-              <a:t>1/13/15</a:t>
+              <a:t>1/9/16</a:t>
             </a:fld>
             <a:endParaRPr lang="en-US"/>
           </a:p>
@@ -3681,7 +3669,7 @@
           <a:p>
             <a:fld id="{4A019F0C-9D18-B54A-9AC9-18AA74EDB034}" type="datetime1">
               <a:rPr lang="en-US" smtClean="0"/>
-              <a:t>1/13/15</a:t>
+              <a:t>1/9/16</a:t>
             </a:fld>
             <a:endParaRPr lang="en-US"/>
           </a:p>
@@ -3991,7 +3979,7 @@
             <a:fld id="{FA3C144B-2939-9A49-B014-915EC3E81866}" type="datetime1">
               <a:rPr lang="en-US" smtClean="0"/>
               <a:pPr/>
-              <a:t>1/13/15</a:t>
+              <a:t>1/9/16</a:t>
             </a:fld>
             <a:endParaRPr lang="en-US" dirty="0"/>
           </a:p>
@@ -4254,7 +4242,7 @@
           <a:p>
             <a:fld id="{FA3C144B-2939-9A49-B014-915EC3E81866}" type="datetime1">
               <a:rPr lang="en-US" smtClean="0"/>
-              <a:t>1/13/15</a:t>
+              <a:t>1/9/16</a:t>
             </a:fld>
             <a:endParaRPr lang="en-US" dirty="0"/>
           </a:p>
@@ -4622,7 +4610,7 @@
           <a:p>
             <a:fld id="{7053BEFA-1175-F644-B249-7D41D72BD3FF}" type="datetime1">
               <a:rPr lang="en-US" smtClean="0"/>
-              <a:t>1/13/15</a:t>
+              <a:t>1/9/16</a:t>
             </a:fld>
             <a:endParaRPr lang="en-US"/>
           </a:p>
@@ -4741,7 +4729,7 @@
             <a:fld id="{FA3C144B-2939-9A49-B014-915EC3E81866}" type="datetime1">
               <a:rPr lang="en-US" smtClean="0"/>
               <a:pPr/>
-              <a:t>1/13/15</a:t>
+              <a:t>1/9/16</a:t>
             </a:fld>
             <a:endParaRPr lang="en-US" dirty="0"/>
           </a:p>
@@ -4958,7 +4946,7 @@
             <a:fld id="{FA3C144B-2939-9A49-B014-915EC3E81866}" type="datetime1">
               <a:rPr lang="en-US" smtClean="0"/>
               <a:pPr/>
-              <a:t>1/13/15</a:t>
+              <a:t>1/9/16</a:t>
             </a:fld>
             <a:endParaRPr lang="en-US" dirty="0"/>
           </a:p>
@@ -5203,7 +5191,7 @@
             <a:fld id="{FA3C144B-2939-9A49-B014-915EC3E81866}" type="datetime1">
               <a:rPr lang="en-US" smtClean="0"/>
               <a:pPr/>
-              <a:t>1/13/15</a:t>
+              <a:t>1/9/16</a:t>
             </a:fld>
             <a:endParaRPr lang="en-US" dirty="0"/>
           </a:p>
@@ -5581,7 +5569,7 @@
           <a:p>
             <a:fld id="{111EEF3B-ABF2-AA4E-9E24-0C6256942674}" type="datetime1">
               <a:rPr lang="en-US" smtClean="0"/>
-              <a:t>1/13/15</a:t>
+              <a:t>1/9/16</a:t>
             </a:fld>
             <a:endParaRPr lang="en-US"/>
           </a:p>
@@ -5745,7 +5733,7 @@
             <a:fld id="{FA3C144B-2939-9A49-B014-915EC3E81866}" type="datetime1">
               <a:rPr lang="en-US" smtClean="0"/>
               <a:pPr/>
-              <a:t>1/13/15</a:t>
+              <a:t>1/9/16</a:t>
             </a:fld>
             <a:endParaRPr lang="en-US" dirty="0"/>
           </a:p>
@@ -6162,7 +6150,7 @@
             <a:fld id="{FA3C144B-2939-9A49-B014-915EC3E81866}" type="datetime1">
               <a:rPr lang="en-US" smtClean="0"/>
               <a:pPr/>
-              <a:t>1/13/15</a:t>
+              <a:t>1/9/16</a:t>
             </a:fld>
             <a:endParaRPr lang="en-US" dirty="0"/>
           </a:p>
@@ -6478,7 +6466,7 @@
             <a:fld id="{FA3C144B-2939-9A49-B014-915EC3E81866}" type="datetime1">
               <a:rPr lang="en-US" smtClean="0"/>
               <a:pPr/>
-              <a:t>1/13/15</a:t>
+              <a:t>1/9/16</a:t>
             </a:fld>
             <a:endParaRPr lang="en-US" dirty="0"/>
           </a:p>
@@ -7144,7 +7132,7 @@
             <a:fld id="{FA3C144B-2939-9A49-B014-915EC3E81866}" type="datetime1">
               <a:rPr lang="en-US" smtClean="0"/>
               <a:pPr/>
-              <a:t>1/13/15</a:t>
+              <a:t>1/9/16</a:t>
             </a:fld>
             <a:endParaRPr lang="en-US" dirty="0"/>
           </a:p>
@@ -7870,7 +7858,11 @@
           <a:p>
             <a:r>
               <a:rPr lang="en-US" dirty="0" smtClean="0"/>
-              <a:t>Byte 1</a:t>
+              <a:t>Byte </a:t>
+            </a:r>
+            <a:r>
+              <a:rPr lang="en-US" dirty="0" smtClean="0"/>
+              <a:t>1: Fusion Tables</a:t>
             </a:r>
             <a:endParaRPr lang="en-US" dirty="0"/>
           </a:p>
@@ -7943,7 +7935,7 @@
           <p:nvPr/>
         </p:nvPicPr>
         <p:blipFill>
-          <a:blip r:embed="rId2"/>
+          <a:blip r:embed="rId3"/>
           <a:stretch>
             <a:fillRect/>
           </a:stretch>
@@ -8194,1405 +8186,6 @@
 </p:sld>
 </file>
 
-<file path=ppt/slides/slide10.xml><?xml version="1.0" encoding="utf-8"?>
-<p:sld xmlns:a="http://schemas.openxmlformats.org/drawingml/2006/main" xmlns:r="http://schemas.openxmlformats.org/officeDocument/2006/relationships" xmlns:p="http://schemas.openxmlformats.org/presentationml/2006/main">
-  <p:cSld>
-    <p:spTree>
-      <p:nvGrpSpPr>
-        <p:cNvPr id="1" name=""/>
-        <p:cNvGrpSpPr/>
-        <p:nvPr/>
-      </p:nvGrpSpPr>
-      <p:grpSpPr>
-        <a:xfrm>
-          <a:off x="0" y="0"/>
-          <a:ext cx="0" cy="0"/>
-          <a:chOff x="0" y="0"/>
-          <a:chExt cx="0" cy="0"/>
-        </a:xfrm>
-      </p:grpSpPr>
-      <p:sp>
-        <p:nvSpPr>
-          <p:cNvPr id="2" name="Title 1"/>
-          <p:cNvSpPr>
-            <a:spLocks noGrp="1"/>
-          </p:cNvSpPr>
-          <p:nvPr>
-            <p:ph type="title"/>
-          </p:nvPr>
-        </p:nvSpPr>
-        <p:spPr/>
-        <p:txBody>
-          <a:bodyPr/>
-          <a:lstStyle/>
-          <a:p>
-            <a:r>
-              <a:rPr lang="en-US" dirty="0" smtClean="0"/>
-              <a:t>Dynamic HTML</a:t>
-            </a:r>
-            <a:endParaRPr lang="en-US" dirty="0"/>
-          </a:p>
-        </p:txBody>
-      </p:sp>
-      <p:pic>
-        <p:nvPicPr>
-          <p:cNvPr id="7" name="Content Placeholder 6" descr="Screen Shot 2014-01-06 at 6.06.38 PM.png"/>
-          <p:cNvPicPr>
-            <a:picLocks noGrp="1" noChangeAspect="1"/>
-          </p:cNvPicPr>
-          <p:nvPr>
-            <p:ph idx="1"/>
-          </p:nvPr>
-        </p:nvPicPr>
-        <p:blipFill>
-          <a:blip r:embed="rId2">
-            <a:extLst>
-              <a:ext uri="{28A0092B-C50C-407E-A947-70E740481C1C}">
-                <a14:useLocalDpi xmlns:a14="http://schemas.microsoft.com/office/drawing/2010/main" val="0"/>
-              </a:ext>
-            </a:extLst>
-          </a:blip>
-          <a:srcRect l="-22817" r="-22817"/>
-          <a:stretch>
-            <a:fillRect/>
-          </a:stretch>
-        </p:blipFill>
-        <p:spPr>
-          <a:xfrm>
-            <a:off x="1128713" y="1847850"/>
-            <a:ext cx="7048500" cy="4379913"/>
-          </a:xfrm>
-        </p:spPr>
-      </p:pic>
-      <p:sp>
-        <p:nvSpPr>
-          <p:cNvPr id="4" name="Date Placeholder 3"/>
-          <p:cNvSpPr>
-            <a:spLocks noGrp="1"/>
-          </p:cNvSpPr>
-          <p:nvPr>
-            <p:ph type="dt" sz="half" idx="10"/>
-          </p:nvPr>
-        </p:nvSpPr>
-        <p:spPr/>
-        <p:txBody>
-          <a:bodyPr/>
-          <a:lstStyle/>
-          <a:p>
-            <a:fld id="{7053BEFA-1175-F644-B249-7D41D72BD3FF}" type="datetime1">
-              <a:rPr lang="en-US" smtClean="0"/>
-              <a:t>1/13/15</a:t>
-            </a:fld>
-            <a:endParaRPr lang="en-US"/>
-          </a:p>
-        </p:txBody>
-      </p:sp>
-      <p:sp>
-        <p:nvSpPr>
-          <p:cNvPr id="5" name="Footer Placeholder 4"/>
-          <p:cNvSpPr>
-            <a:spLocks noGrp="1"/>
-          </p:cNvSpPr>
-          <p:nvPr>
-            <p:ph type="ftr" sz="quarter" idx="11"/>
-          </p:nvPr>
-        </p:nvSpPr>
-        <p:spPr/>
-        <p:txBody>
-          <a:bodyPr/>
-          <a:lstStyle/>
-          <a:p>
-            <a:endParaRPr lang="en-US" dirty="0"/>
-          </a:p>
-        </p:txBody>
-      </p:sp>
-      <p:sp>
-        <p:nvSpPr>
-          <p:cNvPr id="6" name="Slide Number Placeholder 5"/>
-          <p:cNvSpPr>
-            <a:spLocks noGrp="1"/>
-          </p:cNvSpPr>
-          <p:nvPr>
-            <p:ph type="sldNum" sz="quarter" idx="12"/>
-          </p:nvPr>
-        </p:nvSpPr>
-        <p:spPr/>
-        <p:txBody>
-          <a:bodyPr/>
-          <a:lstStyle/>
-          <a:p>
-            <a:fld id="{17E276FA-8F89-B34D-A726-BE3FA1F8DD97}" type="slidenum">
-              <a:rPr lang="en-US" smtClean="0"/>
-              <a:t>10</a:t>
-            </a:fld>
-            <a:endParaRPr lang="en-US" dirty="0"/>
-          </a:p>
-        </p:txBody>
-      </p:sp>
-      <p:sp>
-        <p:nvSpPr>
-          <p:cNvPr id="3" name="Rectangle 2"/>
-          <p:cNvSpPr/>
-          <p:nvPr/>
-        </p:nvSpPr>
-        <p:spPr>
-          <a:xfrm>
-            <a:off x="1960929" y="4631134"/>
-            <a:ext cx="2932056" cy="802979"/>
-          </a:xfrm>
-          <a:prstGeom prst="rect">
-            <a:avLst/>
-          </a:prstGeom>
-          <a:noFill/>
-        </p:spPr>
-        <p:style>
-          <a:lnRef idx="2">
-            <a:schemeClr val="accent1"/>
-          </a:lnRef>
-          <a:fillRef idx="1">
-            <a:schemeClr val="lt1"/>
-          </a:fillRef>
-          <a:effectRef idx="0">
-            <a:schemeClr val="accent1"/>
-          </a:effectRef>
-          <a:fontRef idx="minor">
-            <a:schemeClr val="dk1"/>
-          </a:fontRef>
-        </p:style>
-        <p:txBody>
-          <a:bodyPr rtlCol="0" anchor="ctr"/>
-          <a:lstStyle/>
-          <a:p>
-            <a:pPr algn="ctr"/>
-            <a:endParaRPr lang="en-US"/>
-          </a:p>
-        </p:txBody>
-      </p:sp>
-      <p:sp>
-        <p:nvSpPr>
-          <p:cNvPr id="8" name="TextBox 7"/>
-          <p:cNvSpPr txBox="1"/>
-          <p:nvPr/>
-        </p:nvSpPr>
-        <p:spPr>
-          <a:xfrm>
-            <a:off x="1960929" y="3094674"/>
-            <a:ext cx="2670599" cy="1477328"/>
-          </a:xfrm>
-          <a:prstGeom prst="rect">
-            <a:avLst/>
-          </a:prstGeom>
-          <a:solidFill>
-            <a:schemeClr val="bg1"/>
-          </a:solidFill>
-        </p:spPr>
-        <p:txBody>
-          <a:bodyPr wrap="square" rtlCol="0">
-            <a:spAutoFit/>
-          </a:bodyPr>
-          <a:lstStyle/>
-          <a:p>
-            <a:r>
-              <a:rPr lang="en-US" dirty="0" smtClean="0"/>
-              <a:t>And this is a for loop that will generate multiple copies of the html inside of it, one for each item in the feed variable</a:t>
-            </a:r>
-            <a:endParaRPr lang="en-US" dirty="0"/>
-          </a:p>
-        </p:txBody>
-      </p:sp>
-    </p:spTree>
-    <p:extLst>
-      <p:ext uri="{BB962C8B-B14F-4D97-AF65-F5344CB8AC3E}">
-        <p14:creationId xmlns:p14="http://schemas.microsoft.com/office/powerpoint/2010/main" val="3707203486"/>
-      </p:ext>
-    </p:extLst>
-  </p:cSld>
-  <p:clrMapOvr>
-    <a:masterClrMapping/>
-  </p:clrMapOvr>
-  <p:timing>
-    <p:tnLst>
-      <p:par>
-        <p:cTn xmlns:p14="http://schemas.microsoft.com/office/powerpoint/2010/main" id="1" dur="indefinite" restart="never" nodeType="tmRoot"/>
-      </p:par>
-    </p:tnLst>
-  </p:timing>
-</p:sld>
-</file>
-
-<file path=ppt/slides/slide11.xml><?xml version="1.0" encoding="utf-8"?>
-<p:sld xmlns:a="http://schemas.openxmlformats.org/drawingml/2006/main" xmlns:r="http://schemas.openxmlformats.org/officeDocument/2006/relationships" xmlns:p="http://schemas.openxmlformats.org/presentationml/2006/main">
-  <p:cSld>
-    <p:spTree>
-      <p:nvGrpSpPr>
-        <p:cNvPr id="1" name=""/>
-        <p:cNvGrpSpPr/>
-        <p:nvPr/>
-      </p:nvGrpSpPr>
-      <p:grpSpPr>
-        <a:xfrm>
-          <a:off x="0" y="0"/>
-          <a:ext cx="0" cy="0"/>
-          <a:chOff x="0" y="0"/>
-          <a:chExt cx="0" cy="0"/>
-        </a:xfrm>
-      </p:grpSpPr>
-      <p:sp>
-        <p:nvSpPr>
-          <p:cNvPr id="2" name="Title 1"/>
-          <p:cNvSpPr>
-            <a:spLocks noGrp="1"/>
-          </p:cNvSpPr>
-          <p:nvPr>
-            <p:ph type="title"/>
-          </p:nvPr>
-        </p:nvSpPr>
-        <p:spPr/>
-        <p:txBody>
-          <a:bodyPr/>
-          <a:lstStyle/>
-          <a:p>
-            <a:r>
-              <a:rPr lang="en-US" dirty="0" smtClean="0"/>
-              <a:t>Meanwhile in </a:t>
-            </a:r>
-            <a:r>
-              <a:rPr lang="en-US" dirty="0" err="1" smtClean="0"/>
-              <a:t>Main.py</a:t>
-            </a:r>
-            <a:r>
-              <a:rPr lang="en-US" dirty="0" smtClean="0"/>
-              <a:t>…</a:t>
-            </a:r>
-            <a:endParaRPr lang="en-US" dirty="0"/>
-          </a:p>
-        </p:txBody>
-      </p:sp>
-      <p:sp>
-        <p:nvSpPr>
-          <p:cNvPr id="4" name="Date Placeholder 3"/>
-          <p:cNvSpPr>
-            <a:spLocks noGrp="1"/>
-          </p:cNvSpPr>
-          <p:nvPr>
-            <p:ph type="dt" sz="half" idx="10"/>
-          </p:nvPr>
-        </p:nvSpPr>
-        <p:spPr/>
-        <p:txBody>
-          <a:bodyPr/>
-          <a:lstStyle/>
-          <a:p>
-            <a:fld id="{7053BEFA-1175-F644-B249-7D41D72BD3FF}" type="datetime1">
-              <a:rPr lang="en-US" smtClean="0"/>
-              <a:t>1/13/15</a:t>
-            </a:fld>
-            <a:endParaRPr lang="en-US"/>
-          </a:p>
-        </p:txBody>
-      </p:sp>
-      <p:sp>
-        <p:nvSpPr>
-          <p:cNvPr id="5" name="Footer Placeholder 4"/>
-          <p:cNvSpPr>
-            <a:spLocks noGrp="1"/>
-          </p:cNvSpPr>
-          <p:nvPr>
-            <p:ph type="ftr" sz="quarter" idx="11"/>
-          </p:nvPr>
-        </p:nvSpPr>
-        <p:spPr/>
-        <p:txBody>
-          <a:bodyPr/>
-          <a:lstStyle/>
-          <a:p>
-            <a:endParaRPr lang="en-US" dirty="0"/>
-          </a:p>
-        </p:txBody>
-      </p:sp>
-      <p:sp>
-        <p:nvSpPr>
-          <p:cNvPr id="6" name="Slide Number Placeholder 5"/>
-          <p:cNvSpPr>
-            <a:spLocks noGrp="1"/>
-          </p:cNvSpPr>
-          <p:nvPr>
-            <p:ph type="sldNum" sz="quarter" idx="12"/>
-          </p:nvPr>
-        </p:nvSpPr>
-        <p:spPr/>
-        <p:txBody>
-          <a:bodyPr/>
-          <a:lstStyle/>
-          <a:p>
-            <a:fld id="{17E276FA-8F89-B34D-A726-BE3FA1F8DD97}" type="slidenum">
-              <a:rPr lang="en-US" smtClean="0"/>
-              <a:t>11</a:t>
-            </a:fld>
-            <a:endParaRPr lang="en-US" dirty="0"/>
-          </a:p>
-        </p:txBody>
-      </p:sp>
-      <p:pic>
-        <p:nvPicPr>
-          <p:cNvPr id="10" name="Content Placeholder 9" descr="Screen Shot 2014-01-06 at 6.10.09 PM.png"/>
-          <p:cNvPicPr>
-            <a:picLocks noGrp="1" noChangeAspect="1"/>
-          </p:cNvPicPr>
-          <p:nvPr>
-            <p:ph idx="1"/>
-          </p:nvPr>
-        </p:nvPicPr>
-        <p:blipFill>
-          <a:blip r:embed="rId3">
-            <a:extLst>
-              <a:ext uri="{28A0092B-C50C-407E-A947-70E740481C1C}">
-                <a14:useLocalDpi xmlns:a14="http://schemas.microsoft.com/office/drawing/2010/main" val="0"/>
-              </a:ext>
-            </a:extLst>
-          </a:blip>
-          <a:srcRect t="7158" b="7158"/>
-          <a:stretch>
-            <a:fillRect/>
-          </a:stretch>
-        </p:blipFill>
-        <p:spPr/>
-      </p:pic>
-      <p:sp>
-        <p:nvSpPr>
-          <p:cNvPr id="11" name="TextBox 10"/>
-          <p:cNvSpPr txBox="1"/>
-          <p:nvPr/>
-        </p:nvSpPr>
-        <p:spPr>
-          <a:xfrm>
-            <a:off x="1475366" y="6115085"/>
-            <a:ext cx="3884507" cy="369332"/>
-          </a:xfrm>
-          <a:prstGeom prst="rect">
-            <a:avLst/>
-          </a:prstGeom>
-          <a:noFill/>
-        </p:spPr>
-        <p:txBody>
-          <a:bodyPr wrap="square" rtlCol="0">
-            <a:spAutoFit/>
-          </a:bodyPr>
-          <a:lstStyle/>
-          <a:p>
-            <a:r>
-              <a:rPr lang="en-US" dirty="0" smtClean="0"/>
-              <a:t>… very similar to get</a:t>
-            </a:r>
-            <a:endParaRPr lang="en-US" dirty="0"/>
-          </a:p>
-        </p:txBody>
-      </p:sp>
-    </p:spTree>
-    <p:extLst>
-      <p:ext uri="{BB962C8B-B14F-4D97-AF65-F5344CB8AC3E}">
-        <p14:creationId xmlns:p14="http://schemas.microsoft.com/office/powerpoint/2010/main" val="1846634673"/>
-      </p:ext>
-    </p:extLst>
-  </p:cSld>
-  <p:clrMapOvr>
-    <a:masterClrMapping/>
-  </p:clrMapOvr>
-  <p:timing>
-    <p:tnLst>
-      <p:par>
-        <p:cTn xmlns:p14="http://schemas.microsoft.com/office/powerpoint/2010/main" id="1" dur="indefinite" restart="never" nodeType="tmRoot"/>
-      </p:par>
-    </p:tnLst>
-  </p:timing>
-</p:sld>
-</file>
-
-<file path=ppt/slides/slide12.xml><?xml version="1.0" encoding="utf-8"?>
-<p:sld xmlns:a="http://schemas.openxmlformats.org/drawingml/2006/main" xmlns:r="http://schemas.openxmlformats.org/officeDocument/2006/relationships" xmlns:p="http://schemas.openxmlformats.org/presentationml/2006/main">
-  <p:cSld>
-    <p:spTree>
-      <p:nvGrpSpPr>
-        <p:cNvPr id="1" name=""/>
-        <p:cNvGrpSpPr/>
-        <p:nvPr/>
-      </p:nvGrpSpPr>
-      <p:grpSpPr>
-        <a:xfrm>
-          <a:off x="0" y="0"/>
-          <a:ext cx="0" cy="0"/>
-          <a:chOff x="0" y="0"/>
-          <a:chExt cx="0" cy="0"/>
-        </a:xfrm>
-      </p:grpSpPr>
-      <p:sp>
-        <p:nvSpPr>
-          <p:cNvPr id="2" name="Title 1"/>
-          <p:cNvSpPr>
-            <a:spLocks noGrp="1"/>
-          </p:cNvSpPr>
-          <p:nvPr>
-            <p:ph type="title"/>
-          </p:nvPr>
-        </p:nvSpPr>
-        <p:spPr/>
-        <p:txBody>
-          <a:bodyPr/>
-          <a:lstStyle/>
-          <a:p>
-            <a:r>
-              <a:rPr lang="en-US" dirty="0" err="1" smtClean="0"/>
-              <a:t>Main.py</a:t>
-            </a:r>
-            <a:endParaRPr lang="en-US" dirty="0"/>
-          </a:p>
-        </p:txBody>
-      </p:sp>
-      <p:sp>
-        <p:nvSpPr>
-          <p:cNvPr id="4" name="Date Placeholder 3"/>
-          <p:cNvSpPr>
-            <a:spLocks noGrp="1"/>
-          </p:cNvSpPr>
-          <p:nvPr>
-            <p:ph type="dt" sz="half" idx="10"/>
-          </p:nvPr>
-        </p:nvSpPr>
-        <p:spPr/>
-        <p:txBody>
-          <a:bodyPr/>
-          <a:lstStyle/>
-          <a:p>
-            <a:fld id="{7053BEFA-1175-F644-B249-7D41D72BD3FF}" type="datetime1">
-              <a:rPr lang="en-US" smtClean="0"/>
-              <a:t>1/13/15</a:t>
-            </a:fld>
-            <a:endParaRPr lang="en-US"/>
-          </a:p>
-        </p:txBody>
-      </p:sp>
-      <p:sp>
-        <p:nvSpPr>
-          <p:cNvPr id="5" name="Footer Placeholder 4"/>
-          <p:cNvSpPr>
-            <a:spLocks noGrp="1"/>
-          </p:cNvSpPr>
-          <p:nvPr>
-            <p:ph type="ftr" sz="quarter" idx="11"/>
-          </p:nvPr>
-        </p:nvSpPr>
-        <p:spPr/>
-        <p:txBody>
-          <a:bodyPr/>
-          <a:lstStyle/>
-          <a:p>
-            <a:endParaRPr lang="en-US" dirty="0"/>
-          </a:p>
-        </p:txBody>
-      </p:sp>
-      <p:sp>
-        <p:nvSpPr>
-          <p:cNvPr id="6" name="Slide Number Placeholder 5"/>
-          <p:cNvSpPr>
-            <a:spLocks noGrp="1"/>
-          </p:cNvSpPr>
-          <p:nvPr>
-            <p:ph type="sldNum" sz="quarter" idx="12"/>
-          </p:nvPr>
-        </p:nvSpPr>
-        <p:spPr/>
-        <p:txBody>
-          <a:bodyPr/>
-          <a:lstStyle/>
-          <a:p>
-            <a:fld id="{17E276FA-8F89-B34D-A726-BE3FA1F8DD97}" type="slidenum">
-              <a:rPr lang="en-US" smtClean="0"/>
-              <a:t>12</a:t>
-            </a:fld>
-            <a:endParaRPr lang="en-US" dirty="0"/>
-          </a:p>
-        </p:txBody>
-      </p:sp>
-      <p:pic>
-        <p:nvPicPr>
-          <p:cNvPr id="10" name="Content Placeholder 9" descr="Screen Shot 2014-01-06 at 6.10.09 PM.png"/>
-          <p:cNvPicPr>
-            <a:picLocks noGrp="1" noChangeAspect="1"/>
-          </p:cNvPicPr>
-          <p:nvPr>
-            <p:ph idx="1"/>
-          </p:nvPr>
-        </p:nvPicPr>
-        <p:blipFill>
-          <a:blip r:embed="rId2">
-            <a:extLst>
-              <a:ext uri="{28A0092B-C50C-407E-A947-70E740481C1C}">
-                <a14:useLocalDpi xmlns:a14="http://schemas.microsoft.com/office/drawing/2010/main" val="0"/>
-              </a:ext>
-            </a:extLst>
-          </a:blip>
-          <a:srcRect t="7158" b="7158"/>
-          <a:stretch>
-            <a:fillRect/>
-          </a:stretch>
-        </p:blipFill>
-        <p:spPr/>
-      </p:pic>
-      <p:sp>
-        <p:nvSpPr>
-          <p:cNvPr id="11" name="TextBox 10"/>
-          <p:cNvSpPr txBox="1"/>
-          <p:nvPr/>
-        </p:nvSpPr>
-        <p:spPr>
-          <a:xfrm>
-            <a:off x="1475366" y="6115085"/>
-            <a:ext cx="3884507" cy="369332"/>
-          </a:xfrm>
-          <a:prstGeom prst="rect">
-            <a:avLst/>
-          </a:prstGeom>
-          <a:noFill/>
-        </p:spPr>
-        <p:txBody>
-          <a:bodyPr wrap="square" rtlCol="0">
-            <a:spAutoFit/>
-          </a:bodyPr>
-          <a:lstStyle/>
-          <a:p>
-            <a:r>
-              <a:rPr lang="en-US" dirty="0" smtClean="0"/>
-              <a:t>… very similar to get</a:t>
-            </a:r>
-            <a:endParaRPr lang="en-US" dirty="0"/>
-          </a:p>
-        </p:txBody>
-      </p:sp>
-      <p:sp>
-        <p:nvSpPr>
-          <p:cNvPr id="8" name="Rectangle 7"/>
-          <p:cNvSpPr/>
-          <p:nvPr/>
-        </p:nvSpPr>
-        <p:spPr>
-          <a:xfrm>
-            <a:off x="1662121" y="2502306"/>
-            <a:ext cx="5572452" cy="802979"/>
-          </a:xfrm>
-          <a:prstGeom prst="rect">
-            <a:avLst/>
-          </a:prstGeom>
-          <a:noFill/>
-        </p:spPr>
-        <p:style>
-          <a:lnRef idx="2">
-            <a:schemeClr val="accent1"/>
-          </a:lnRef>
-          <a:fillRef idx="1">
-            <a:schemeClr val="lt1"/>
-          </a:fillRef>
-          <a:effectRef idx="0">
-            <a:schemeClr val="accent1"/>
-          </a:effectRef>
-          <a:fontRef idx="minor">
-            <a:schemeClr val="dk1"/>
-          </a:fontRef>
-        </p:style>
-        <p:txBody>
-          <a:bodyPr rtlCol="0" anchor="ctr"/>
-          <a:lstStyle/>
-          <a:p>
-            <a:pPr algn="ctr"/>
-            <a:endParaRPr lang="en-US"/>
-          </a:p>
-        </p:txBody>
-      </p:sp>
-      <p:sp>
-        <p:nvSpPr>
-          <p:cNvPr id="9" name="TextBox 8"/>
-          <p:cNvSpPr txBox="1"/>
-          <p:nvPr/>
-        </p:nvSpPr>
-        <p:spPr>
-          <a:xfrm>
-            <a:off x="1662121" y="1520867"/>
-            <a:ext cx="5572452" cy="923330"/>
-          </a:xfrm>
-          <a:prstGeom prst="rect">
-            <a:avLst/>
-          </a:prstGeom>
-          <a:solidFill>
-            <a:schemeClr val="bg1"/>
-          </a:solidFill>
-        </p:spPr>
-        <p:txBody>
-          <a:bodyPr wrap="square" rtlCol="0">
-            <a:spAutoFit/>
-          </a:bodyPr>
-          <a:lstStyle/>
-          <a:p>
-            <a:r>
-              <a:rPr lang="en-US" dirty="0" smtClean="0"/>
-              <a:t>This statement will download the contents of the RSS feed using the </a:t>
-            </a:r>
-            <a:r>
-              <a:rPr lang="en-US" i="1" dirty="0" err="1" smtClean="0"/>
-              <a:t>feedparser</a:t>
-            </a:r>
-            <a:r>
-              <a:rPr lang="en-US" i="1" dirty="0" smtClean="0"/>
-              <a:t> </a:t>
-            </a:r>
-            <a:r>
-              <a:rPr lang="en-US" dirty="0" smtClean="0"/>
-              <a:t>library, which returns a python </a:t>
-            </a:r>
-            <a:r>
-              <a:rPr lang="en-US" i="1" dirty="0" smtClean="0"/>
-              <a:t>dictionary </a:t>
-            </a:r>
-            <a:r>
-              <a:rPr lang="en-US" dirty="0" smtClean="0"/>
-              <a:t>object containing the key information</a:t>
-            </a:r>
-            <a:endParaRPr lang="en-US" dirty="0"/>
-          </a:p>
-        </p:txBody>
-      </p:sp>
-    </p:spTree>
-    <p:extLst>
-      <p:ext uri="{BB962C8B-B14F-4D97-AF65-F5344CB8AC3E}">
-        <p14:creationId xmlns:p14="http://schemas.microsoft.com/office/powerpoint/2010/main" val="1830119408"/>
-      </p:ext>
-    </p:extLst>
-  </p:cSld>
-  <p:clrMapOvr>
-    <a:masterClrMapping/>
-  </p:clrMapOvr>
-  <p:timing>
-    <p:tnLst>
-      <p:par>
-        <p:cTn xmlns:p14="http://schemas.microsoft.com/office/powerpoint/2010/main" id="1" dur="indefinite" restart="never" nodeType="tmRoot"/>
-      </p:par>
-    </p:tnLst>
-  </p:timing>
-</p:sld>
-</file>
-
-<file path=ppt/slides/slide13.xml><?xml version="1.0" encoding="utf-8"?>
-<p:sld xmlns:a="http://schemas.openxmlformats.org/drawingml/2006/main" xmlns:r="http://schemas.openxmlformats.org/officeDocument/2006/relationships" xmlns:p="http://schemas.openxmlformats.org/presentationml/2006/main">
-  <p:cSld>
-    <p:spTree>
-      <p:nvGrpSpPr>
-        <p:cNvPr id="1" name=""/>
-        <p:cNvGrpSpPr/>
-        <p:nvPr/>
-      </p:nvGrpSpPr>
-      <p:grpSpPr>
-        <a:xfrm>
-          <a:off x="0" y="0"/>
-          <a:ext cx="0" cy="0"/>
-          <a:chOff x="0" y="0"/>
-          <a:chExt cx="0" cy="0"/>
-        </a:xfrm>
-      </p:grpSpPr>
-      <p:sp>
-        <p:nvSpPr>
-          <p:cNvPr id="2" name="Title 1"/>
-          <p:cNvSpPr>
-            <a:spLocks noGrp="1"/>
-          </p:cNvSpPr>
-          <p:nvPr>
-            <p:ph type="title"/>
-          </p:nvPr>
-        </p:nvSpPr>
-        <p:spPr/>
-        <p:txBody>
-          <a:bodyPr/>
-          <a:lstStyle/>
-          <a:p>
-            <a:r>
-              <a:rPr lang="en-US" dirty="0" err="1" smtClean="0"/>
-              <a:t>Main.py</a:t>
-            </a:r>
-            <a:endParaRPr lang="en-US" dirty="0"/>
-          </a:p>
-        </p:txBody>
-      </p:sp>
-      <p:sp>
-        <p:nvSpPr>
-          <p:cNvPr id="4" name="Date Placeholder 3"/>
-          <p:cNvSpPr>
-            <a:spLocks noGrp="1"/>
-          </p:cNvSpPr>
-          <p:nvPr>
-            <p:ph type="dt" sz="half" idx="10"/>
-          </p:nvPr>
-        </p:nvSpPr>
-        <p:spPr/>
-        <p:txBody>
-          <a:bodyPr/>
-          <a:lstStyle/>
-          <a:p>
-            <a:fld id="{7053BEFA-1175-F644-B249-7D41D72BD3FF}" type="datetime1">
-              <a:rPr lang="en-US" smtClean="0"/>
-              <a:t>1/13/15</a:t>
-            </a:fld>
-            <a:endParaRPr lang="en-US"/>
-          </a:p>
-        </p:txBody>
-      </p:sp>
-      <p:sp>
-        <p:nvSpPr>
-          <p:cNvPr id="5" name="Footer Placeholder 4"/>
-          <p:cNvSpPr>
-            <a:spLocks noGrp="1"/>
-          </p:cNvSpPr>
-          <p:nvPr>
-            <p:ph type="ftr" sz="quarter" idx="11"/>
-          </p:nvPr>
-        </p:nvSpPr>
-        <p:spPr/>
-        <p:txBody>
-          <a:bodyPr/>
-          <a:lstStyle/>
-          <a:p>
-            <a:endParaRPr lang="en-US" dirty="0"/>
-          </a:p>
-        </p:txBody>
-      </p:sp>
-      <p:sp>
-        <p:nvSpPr>
-          <p:cNvPr id="6" name="Slide Number Placeholder 5"/>
-          <p:cNvSpPr>
-            <a:spLocks noGrp="1"/>
-          </p:cNvSpPr>
-          <p:nvPr>
-            <p:ph type="sldNum" sz="quarter" idx="12"/>
-          </p:nvPr>
-        </p:nvSpPr>
-        <p:spPr/>
-        <p:txBody>
-          <a:bodyPr/>
-          <a:lstStyle/>
-          <a:p>
-            <a:fld id="{17E276FA-8F89-B34D-A726-BE3FA1F8DD97}" type="slidenum">
-              <a:rPr lang="en-US" smtClean="0"/>
-              <a:t>13</a:t>
-            </a:fld>
-            <a:endParaRPr lang="en-US" dirty="0"/>
-          </a:p>
-        </p:txBody>
-      </p:sp>
-      <p:pic>
-        <p:nvPicPr>
-          <p:cNvPr id="10" name="Content Placeholder 9" descr="Screen Shot 2014-01-06 at 6.10.09 PM.png"/>
-          <p:cNvPicPr>
-            <a:picLocks noGrp="1" noChangeAspect="1"/>
-          </p:cNvPicPr>
-          <p:nvPr>
-            <p:ph idx="1"/>
-          </p:nvPr>
-        </p:nvPicPr>
-        <p:blipFill>
-          <a:blip r:embed="rId2">
-            <a:extLst>
-              <a:ext uri="{28A0092B-C50C-407E-A947-70E740481C1C}">
-                <a14:useLocalDpi xmlns:a14="http://schemas.microsoft.com/office/drawing/2010/main" val="0"/>
-              </a:ext>
-            </a:extLst>
-          </a:blip>
-          <a:srcRect t="7158" b="7158"/>
-          <a:stretch>
-            <a:fillRect/>
-          </a:stretch>
-        </p:blipFill>
-        <p:spPr/>
-      </p:pic>
-      <p:sp>
-        <p:nvSpPr>
-          <p:cNvPr id="11" name="TextBox 10"/>
-          <p:cNvSpPr txBox="1"/>
-          <p:nvPr/>
-        </p:nvSpPr>
-        <p:spPr>
-          <a:xfrm>
-            <a:off x="1475366" y="6115085"/>
-            <a:ext cx="3884507" cy="369332"/>
-          </a:xfrm>
-          <a:prstGeom prst="rect">
-            <a:avLst/>
-          </a:prstGeom>
-          <a:noFill/>
-        </p:spPr>
-        <p:txBody>
-          <a:bodyPr wrap="square" rtlCol="0">
-            <a:spAutoFit/>
-          </a:bodyPr>
-          <a:lstStyle/>
-          <a:p>
-            <a:r>
-              <a:rPr lang="en-US" dirty="0" smtClean="0"/>
-              <a:t>… very similar to get</a:t>
-            </a:r>
-            <a:endParaRPr lang="en-US" dirty="0"/>
-          </a:p>
-        </p:txBody>
-      </p:sp>
-      <p:sp>
-        <p:nvSpPr>
-          <p:cNvPr id="8" name="Rectangle 7"/>
-          <p:cNvSpPr/>
-          <p:nvPr/>
-        </p:nvSpPr>
-        <p:spPr>
-          <a:xfrm>
-            <a:off x="1662121" y="3267940"/>
-            <a:ext cx="5572452" cy="802979"/>
-          </a:xfrm>
-          <a:prstGeom prst="rect">
-            <a:avLst/>
-          </a:prstGeom>
-          <a:noFill/>
-        </p:spPr>
-        <p:style>
-          <a:lnRef idx="2">
-            <a:schemeClr val="accent1"/>
-          </a:lnRef>
-          <a:fillRef idx="1">
-            <a:schemeClr val="lt1"/>
-          </a:fillRef>
-          <a:effectRef idx="0">
-            <a:schemeClr val="accent1"/>
-          </a:effectRef>
-          <a:fontRef idx="minor">
-            <a:schemeClr val="dk1"/>
-          </a:fontRef>
-        </p:style>
-        <p:txBody>
-          <a:bodyPr rtlCol="0" anchor="ctr"/>
-          <a:lstStyle/>
-          <a:p>
-            <a:pPr algn="ctr"/>
-            <a:endParaRPr lang="en-US"/>
-          </a:p>
-        </p:txBody>
-      </p:sp>
-      <p:sp>
-        <p:nvSpPr>
-          <p:cNvPr id="9" name="TextBox 8"/>
-          <p:cNvSpPr txBox="1"/>
-          <p:nvPr/>
-        </p:nvSpPr>
-        <p:spPr>
-          <a:xfrm>
-            <a:off x="1662121" y="2006391"/>
-            <a:ext cx="5572452" cy="1200329"/>
-          </a:xfrm>
-          <a:prstGeom prst="rect">
-            <a:avLst/>
-          </a:prstGeom>
-          <a:solidFill>
-            <a:schemeClr val="bg1"/>
-          </a:solidFill>
-        </p:spPr>
-        <p:txBody>
-          <a:bodyPr wrap="square" rtlCol="0">
-            <a:spAutoFit/>
-          </a:bodyPr>
-          <a:lstStyle/>
-          <a:p>
-            <a:r>
-              <a:rPr lang="en-US" dirty="0" smtClean="0"/>
-              <a:t>This is a type of for loop that can be used in python to efficiently construct a list (in this case a list of dictionaries that </a:t>
-            </a:r>
-            <a:r>
-              <a:rPr lang="en-US" i="1" dirty="0" smtClean="0"/>
-              <a:t>we </a:t>
-            </a:r>
-            <a:r>
-              <a:rPr lang="en-US" dirty="0" smtClean="0"/>
-              <a:t>construct which are designed specifically to pass only necessary information the loop in </a:t>
-            </a:r>
-            <a:r>
-              <a:rPr lang="en-US" dirty="0" err="1" smtClean="0"/>
-              <a:t>index.html</a:t>
-            </a:r>
-            <a:r>
-              <a:rPr lang="en-US" dirty="0" smtClean="0"/>
-              <a:t>).</a:t>
-            </a:r>
-            <a:endParaRPr lang="en-US" dirty="0"/>
-          </a:p>
-        </p:txBody>
-      </p:sp>
-    </p:spTree>
-    <p:extLst>
-      <p:ext uri="{BB962C8B-B14F-4D97-AF65-F5344CB8AC3E}">
-        <p14:creationId xmlns:p14="http://schemas.microsoft.com/office/powerpoint/2010/main" val="1840517789"/>
-      </p:ext>
-    </p:extLst>
-  </p:cSld>
-  <p:clrMapOvr>
-    <a:masterClrMapping/>
-  </p:clrMapOvr>
-  <p:timing>
-    <p:tnLst>
-      <p:par>
-        <p:cTn xmlns:p14="http://schemas.microsoft.com/office/powerpoint/2010/main" id="1" dur="indefinite" restart="never" nodeType="tmRoot"/>
-      </p:par>
-    </p:tnLst>
-  </p:timing>
-</p:sld>
-</file>
-
-<file path=ppt/slides/slide14.xml><?xml version="1.0" encoding="utf-8"?>
-<p:sld xmlns:a="http://schemas.openxmlformats.org/drawingml/2006/main" xmlns:r="http://schemas.openxmlformats.org/officeDocument/2006/relationships" xmlns:p="http://schemas.openxmlformats.org/presentationml/2006/main">
-  <p:cSld>
-    <p:spTree>
-      <p:nvGrpSpPr>
-        <p:cNvPr id="1" name=""/>
-        <p:cNvGrpSpPr/>
-        <p:nvPr/>
-      </p:nvGrpSpPr>
-      <p:grpSpPr>
-        <a:xfrm>
-          <a:off x="0" y="0"/>
-          <a:ext cx="0" cy="0"/>
-          <a:chOff x="0" y="0"/>
-          <a:chExt cx="0" cy="0"/>
-        </a:xfrm>
-      </p:grpSpPr>
-      <p:sp>
-        <p:nvSpPr>
-          <p:cNvPr id="2" name="Title 1"/>
-          <p:cNvSpPr>
-            <a:spLocks noGrp="1"/>
-          </p:cNvSpPr>
-          <p:nvPr>
-            <p:ph type="title"/>
-          </p:nvPr>
-        </p:nvSpPr>
-        <p:spPr/>
-        <p:txBody>
-          <a:bodyPr/>
-          <a:lstStyle/>
-          <a:p>
-            <a:r>
-              <a:rPr lang="en-US" dirty="0" err="1" smtClean="0"/>
-              <a:t>Main.py</a:t>
-            </a:r>
-            <a:endParaRPr lang="en-US" dirty="0"/>
-          </a:p>
-        </p:txBody>
-      </p:sp>
-      <p:sp>
-        <p:nvSpPr>
-          <p:cNvPr id="4" name="Date Placeholder 3"/>
-          <p:cNvSpPr>
-            <a:spLocks noGrp="1"/>
-          </p:cNvSpPr>
-          <p:nvPr>
-            <p:ph type="dt" sz="half" idx="10"/>
-          </p:nvPr>
-        </p:nvSpPr>
-        <p:spPr/>
-        <p:txBody>
-          <a:bodyPr/>
-          <a:lstStyle/>
-          <a:p>
-            <a:fld id="{7053BEFA-1175-F644-B249-7D41D72BD3FF}" type="datetime1">
-              <a:rPr lang="en-US" smtClean="0"/>
-              <a:t>1/13/15</a:t>
-            </a:fld>
-            <a:endParaRPr lang="en-US"/>
-          </a:p>
-        </p:txBody>
-      </p:sp>
-      <p:sp>
-        <p:nvSpPr>
-          <p:cNvPr id="5" name="Footer Placeholder 4"/>
-          <p:cNvSpPr>
-            <a:spLocks noGrp="1"/>
-          </p:cNvSpPr>
-          <p:nvPr>
-            <p:ph type="ftr" sz="quarter" idx="11"/>
-          </p:nvPr>
-        </p:nvSpPr>
-        <p:spPr/>
-        <p:txBody>
-          <a:bodyPr/>
-          <a:lstStyle/>
-          <a:p>
-            <a:endParaRPr lang="en-US" dirty="0"/>
-          </a:p>
-        </p:txBody>
-      </p:sp>
-      <p:sp>
-        <p:nvSpPr>
-          <p:cNvPr id="6" name="Slide Number Placeholder 5"/>
-          <p:cNvSpPr>
-            <a:spLocks noGrp="1"/>
-          </p:cNvSpPr>
-          <p:nvPr>
-            <p:ph type="sldNum" sz="quarter" idx="12"/>
-          </p:nvPr>
-        </p:nvSpPr>
-        <p:spPr/>
-        <p:txBody>
-          <a:bodyPr/>
-          <a:lstStyle/>
-          <a:p>
-            <a:fld id="{17E276FA-8F89-B34D-A726-BE3FA1F8DD97}" type="slidenum">
-              <a:rPr lang="en-US" smtClean="0"/>
-              <a:t>14</a:t>
-            </a:fld>
-            <a:endParaRPr lang="en-US" dirty="0"/>
-          </a:p>
-        </p:txBody>
-      </p:sp>
-      <p:pic>
-        <p:nvPicPr>
-          <p:cNvPr id="10" name="Content Placeholder 9" descr="Screen Shot 2014-01-06 at 6.10.09 PM.png"/>
-          <p:cNvPicPr>
-            <a:picLocks noGrp="1" noChangeAspect="1"/>
-          </p:cNvPicPr>
-          <p:nvPr>
-            <p:ph idx="1"/>
-          </p:nvPr>
-        </p:nvPicPr>
-        <p:blipFill>
-          <a:blip r:embed="rId2">
-            <a:extLst>
-              <a:ext uri="{28A0092B-C50C-407E-A947-70E740481C1C}">
-                <a14:useLocalDpi xmlns:a14="http://schemas.microsoft.com/office/drawing/2010/main" val="0"/>
-              </a:ext>
-            </a:extLst>
-          </a:blip>
-          <a:srcRect t="7158" b="7158"/>
-          <a:stretch>
-            <a:fillRect/>
-          </a:stretch>
-        </p:blipFill>
-        <p:spPr/>
-      </p:pic>
-      <p:sp>
-        <p:nvSpPr>
-          <p:cNvPr id="11" name="TextBox 10"/>
-          <p:cNvSpPr txBox="1"/>
-          <p:nvPr/>
-        </p:nvSpPr>
-        <p:spPr>
-          <a:xfrm>
-            <a:off x="1475366" y="6115085"/>
-            <a:ext cx="3884507" cy="369332"/>
-          </a:xfrm>
-          <a:prstGeom prst="rect">
-            <a:avLst/>
-          </a:prstGeom>
-          <a:noFill/>
-        </p:spPr>
-        <p:txBody>
-          <a:bodyPr wrap="square" rtlCol="0">
-            <a:spAutoFit/>
-          </a:bodyPr>
-          <a:lstStyle/>
-          <a:p>
-            <a:r>
-              <a:rPr lang="en-US" dirty="0" smtClean="0"/>
-              <a:t>… very similar to get</a:t>
-            </a:r>
-            <a:endParaRPr lang="en-US" dirty="0"/>
-          </a:p>
-        </p:txBody>
-      </p:sp>
-      <p:sp>
-        <p:nvSpPr>
-          <p:cNvPr id="8" name="Rectangle 7"/>
-          <p:cNvSpPr/>
-          <p:nvPr/>
-        </p:nvSpPr>
-        <p:spPr>
-          <a:xfrm>
-            <a:off x="1662121" y="4033574"/>
-            <a:ext cx="5572452" cy="1176452"/>
-          </a:xfrm>
-          <a:prstGeom prst="rect">
-            <a:avLst/>
-          </a:prstGeom>
-          <a:noFill/>
-        </p:spPr>
-        <p:style>
-          <a:lnRef idx="2">
-            <a:schemeClr val="accent1"/>
-          </a:lnRef>
-          <a:fillRef idx="1">
-            <a:schemeClr val="lt1"/>
-          </a:fillRef>
-          <a:effectRef idx="0">
-            <a:schemeClr val="accent1"/>
-          </a:effectRef>
-          <a:fontRef idx="minor">
-            <a:schemeClr val="dk1"/>
-          </a:fontRef>
-        </p:style>
-        <p:txBody>
-          <a:bodyPr rtlCol="0" anchor="ctr"/>
-          <a:lstStyle/>
-          <a:p>
-            <a:pPr algn="ctr"/>
-            <a:endParaRPr lang="en-US"/>
-          </a:p>
-        </p:txBody>
-      </p:sp>
-      <p:sp>
-        <p:nvSpPr>
-          <p:cNvPr id="9" name="TextBox 8"/>
-          <p:cNvSpPr txBox="1"/>
-          <p:nvPr/>
-        </p:nvSpPr>
-        <p:spPr>
-          <a:xfrm>
-            <a:off x="1662121" y="2716003"/>
-            <a:ext cx="5572452" cy="1200329"/>
-          </a:xfrm>
-          <a:prstGeom prst="rect">
-            <a:avLst/>
-          </a:prstGeom>
-          <a:solidFill>
-            <a:schemeClr val="bg1"/>
-          </a:solidFill>
-        </p:spPr>
-        <p:txBody>
-          <a:bodyPr wrap="square" rtlCol="0">
-            <a:spAutoFit/>
-          </a:bodyPr>
-          <a:lstStyle/>
-          <a:p>
-            <a:r>
-              <a:rPr lang="en-US" dirty="0" smtClean="0"/>
-              <a:t>We add that list to the </a:t>
-            </a:r>
-            <a:r>
-              <a:rPr lang="en-US" i="1" dirty="0" smtClean="0"/>
-              <a:t>context </a:t>
-            </a:r>
-            <a:r>
-              <a:rPr lang="en-US" dirty="0" smtClean="0"/>
-              <a:t>variable and then pass it to a special function (</a:t>
-            </a:r>
-            <a:r>
-              <a:rPr lang="en-US" dirty="0" err="1" smtClean="0"/>
-              <a:t>render_response</a:t>
-            </a:r>
-            <a:r>
-              <a:rPr lang="en-US" dirty="0" smtClean="0"/>
-              <a:t>), which invokes the dynamic code in </a:t>
-            </a:r>
-            <a:r>
-              <a:rPr lang="en-US" dirty="0" err="1" smtClean="0"/>
-              <a:t>index.html</a:t>
-            </a:r>
-            <a:r>
-              <a:rPr lang="en-US" dirty="0" smtClean="0"/>
-              <a:t> and renders the results to the user. </a:t>
-            </a:r>
-            <a:endParaRPr lang="en-US" dirty="0"/>
-          </a:p>
-        </p:txBody>
-      </p:sp>
-    </p:spTree>
-    <p:extLst>
-      <p:ext uri="{BB962C8B-B14F-4D97-AF65-F5344CB8AC3E}">
-        <p14:creationId xmlns:p14="http://schemas.microsoft.com/office/powerpoint/2010/main" val="1227956596"/>
-      </p:ext>
-    </p:extLst>
-  </p:cSld>
-  <p:clrMapOvr>
-    <a:masterClrMapping/>
-  </p:clrMapOvr>
-  <p:timing>
-    <p:tnLst>
-      <p:par>
-        <p:cTn xmlns:p14="http://schemas.microsoft.com/office/powerpoint/2010/main" id="1" dur="indefinite" restart="never" nodeType="tmRoot"/>
-      </p:par>
-    </p:tnLst>
-  </p:timing>
-</p:sld>
-</file>
-
-<file path=ppt/slides/slide15.xml><?xml version="1.0" encoding="utf-8"?>
-<p:sld xmlns:a="http://schemas.openxmlformats.org/drawingml/2006/main" xmlns:r="http://schemas.openxmlformats.org/officeDocument/2006/relationships" xmlns:p="http://schemas.openxmlformats.org/presentationml/2006/main">
-  <p:cSld>
-    <p:spTree>
-      <p:nvGrpSpPr>
-        <p:cNvPr id="1" name=""/>
-        <p:cNvGrpSpPr/>
-        <p:nvPr/>
-      </p:nvGrpSpPr>
-      <p:grpSpPr>
-        <a:xfrm>
-          <a:off x="0" y="0"/>
-          <a:ext cx="0" cy="0"/>
-          <a:chOff x="0" y="0"/>
-          <a:chExt cx="0" cy="0"/>
-        </a:xfrm>
-      </p:grpSpPr>
-      <p:sp>
-        <p:nvSpPr>
-          <p:cNvPr id="2" name="Title 1"/>
-          <p:cNvSpPr>
-            <a:spLocks noGrp="1"/>
-          </p:cNvSpPr>
-          <p:nvPr>
-            <p:ph type="title"/>
-          </p:nvPr>
-        </p:nvSpPr>
-        <p:spPr/>
-        <p:txBody>
-          <a:bodyPr/>
-          <a:lstStyle/>
-          <a:p>
-            <a:r>
-              <a:rPr lang="en-US" dirty="0" smtClean="0"/>
-              <a:t>Hints and Requests</a:t>
-            </a:r>
-            <a:endParaRPr lang="en-US" dirty="0"/>
-          </a:p>
-        </p:txBody>
-      </p:sp>
-      <p:sp>
-        <p:nvSpPr>
-          <p:cNvPr id="3" name="Date Placeholder 2"/>
-          <p:cNvSpPr>
-            <a:spLocks noGrp="1"/>
-          </p:cNvSpPr>
-          <p:nvPr>
-            <p:ph type="dt" sz="half" idx="10"/>
-          </p:nvPr>
-        </p:nvSpPr>
-        <p:spPr/>
-        <p:txBody>
-          <a:bodyPr/>
-          <a:lstStyle/>
-          <a:p>
-            <a:fld id="{FA3C144B-2939-9A49-B014-915EC3E81866}" type="datetime1">
-              <a:rPr lang="en-US" smtClean="0"/>
-              <a:pPr/>
-              <a:t>1/13/15</a:t>
-            </a:fld>
-            <a:endParaRPr lang="en-US" dirty="0"/>
-          </a:p>
-        </p:txBody>
-      </p:sp>
-      <p:sp>
-        <p:nvSpPr>
-          <p:cNvPr id="4" name="Footer Placeholder 3"/>
-          <p:cNvSpPr>
-            <a:spLocks noGrp="1"/>
-          </p:cNvSpPr>
-          <p:nvPr>
-            <p:ph type="ftr" sz="quarter" idx="11"/>
-          </p:nvPr>
-        </p:nvSpPr>
-        <p:spPr/>
-        <p:txBody>
-          <a:bodyPr/>
-          <a:lstStyle/>
-          <a:p>
-            <a:endParaRPr lang="en-US" dirty="0"/>
-          </a:p>
-        </p:txBody>
-      </p:sp>
-      <p:sp>
-        <p:nvSpPr>
-          <p:cNvPr id="5" name="Slide Number Placeholder 4"/>
-          <p:cNvSpPr>
-            <a:spLocks noGrp="1"/>
-          </p:cNvSpPr>
-          <p:nvPr>
-            <p:ph type="sldNum" sz="quarter" idx="12"/>
-          </p:nvPr>
-        </p:nvSpPr>
-        <p:spPr/>
-        <p:txBody>
-          <a:bodyPr/>
-          <a:lstStyle/>
-          <a:p>
-            <a:fld id="{17E276FA-8F89-B34D-A726-BE3FA1F8DD97}" type="slidenum">
-              <a:rPr lang="en-US" smtClean="0"/>
-              <a:pPr/>
-              <a:t>15</a:t>
-            </a:fld>
-            <a:endParaRPr lang="en-US" dirty="0"/>
-          </a:p>
-        </p:txBody>
-      </p:sp>
-      <p:sp>
-        <p:nvSpPr>
-          <p:cNvPr id="6" name="Content Placeholder 5"/>
-          <p:cNvSpPr>
-            <a:spLocks noGrp="1"/>
-          </p:cNvSpPr>
-          <p:nvPr>
-            <p:ph idx="1"/>
-          </p:nvPr>
-        </p:nvSpPr>
-        <p:spPr>
-          <a:xfrm>
-            <a:off x="1119720" y="1623065"/>
-            <a:ext cx="7110947" cy="4379976"/>
-          </a:xfrm>
-        </p:spPr>
-        <p:txBody>
-          <a:bodyPr/>
-          <a:lstStyle/>
-          <a:p>
-            <a:r>
-              <a:rPr lang="en-US" dirty="0" smtClean="0"/>
-              <a:t>Be sure to follow the tutorial step by step. </a:t>
-            </a:r>
-          </a:p>
-          <a:p>
-            <a:r>
-              <a:rPr lang="en-US" dirty="0" smtClean="0"/>
-              <a:t>You will need to create accounts and specific things in Google and Yahoo! Pipes in order to complete this assignment. </a:t>
-            </a:r>
-          </a:p>
-          <a:p>
-            <a:r>
-              <a:rPr lang="en-US" dirty="0" smtClean="0"/>
-              <a:t>Leave enough time to work out the kinks – even with a tutorial and source code you will run into some.</a:t>
-            </a:r>
-          </a:p>
-          <a:p>
-            <a:r>
-              <a:rPr lang="en-US" dirty="0" smtClean="0"/>
-              <a:t>Questions and answers are most welcome as comments on the tutorial so we all benefit.</a:t>
-            </a:r>
-          </a:p>
-        </p:txBody>
-      </p:sp>
-    </p:spTree>
-    <p:extLst>
-      <p:ext uri="{BB962C8B-B14F-4D97-AF65-F5344CB8AC3E}">
-        <p14:creationId xmlns:p14="http://schemas.microsoft.com/office/powerpoint/2010/main" val="1137916481"/>
-      </p:ext>
-    </p:extLst>
-  </p:cSld>
-  <p:clrMapOvr>
-    <a:masterClrMapping/>
-  </p:clrMapOvr>
-  <p:timing>
-    <p:tnLst>
-      <p:par>
-        <p:cTn xmlns:p14="http://schemas.microsoft.com/office/powerpoint/2010/main" id="1" dur="indefinite" restart="never" nodeType="tmRoot"/>
-      </p:par>
-    </p:tnLst>
-  </p:timing>
-</p:sld>
-</file>
-
 <file path=ppt/slides/slide2.xml><?xml version="1.0" encoding="utf-8"?>
 <p:sld xmlns:a="http://schemas.openxmlformats.org/drawingml/2006/main" xmlns:r="http://schemas.openxmlformats.org/officeDocument/2006/relationships" xmlns:p="http://schemas.openxmlformats.org/presentationml/2006/main">
   <p:cSld>
@@ -9658,15 +8251,47 @@
             </a:pPr>
             <a:r>
               <a:rPr lang="en-US" dirty="0" smtClean="0"/>
-              <a:t>Display RSS data provided </a:t>
+              <a:t>Learning </a:t>
+            </a:r>
+            <a:r>
+              <a:rPr lang="en-US" dirty="0" smtClean="0"/>
+              <a:t>goals: </a:t>
+            </a:r>
+            <a:endParaRPr lang="en-US" dirty="0"/>
+          </a:p>
+          <a:p>
+            <a:pPr lvl="1"/>
+            <a:r>
+              <a:rPr lang="en-US" dirty="0" smtClean="0"/>
+              <a:t>A </a:t>
             </a:r>
             <a:r>
               <a:rPr lang="en-US" dirty="0"/>
-              <a:t>by Yahoo </a:t>
-            </a:r>
-            <a:r>
-              <a:rPr lang="en-US" dirty="0" smtClean="0"/>
-              <a:t>Pipes</a:t>
+              <a:t>first experience with </a:t>
+            </a:r>
+            <a:r>
+              <a:rPr lang="en-US" dirty="0" smtClean="0"/>
+              <a:t>Python/</a:t>
+            </a:r>
+            <a:r>
+              <a:rPr lang="en-US" dirty="0" err="1" smtClean="0"/>
+              <a:t>Appspot</a:t>
+            </a:r>
+            <a:endParaRPr lang="en-US" dirty="0"/>
+          </a:p>
+          <a:p>
+            <a:pPr lvl="1"/>
+            <a:r>
+              <a:rPr lang="en-US" dirty="0" smtClean="0"/>
+              <a:t>Setting </a:t>
+            </a:r>
+            <a:r>
+              <a:rPr lang="en-US" dirty="0"/>
+              <a:t>up a question and deciding what data helps to answer the question</a:t>
+            </a:r>
+            <a:r>
+              <a:rPr lang="en-US" dirty="0" smtClean="0"/>
+              <a:t>.</a:t>
             </a:r>
           </a:p>
           <a:p>
@@ -9674,54 +8299,27 @@
               <a:buNone/>
             </a:pPr>
             <a:r>
-              <a:rPr lang="en-US" dirty="0" smtClean="0"/>
-              <a:t>Learning goals: </a:t>
-            </a:r>
-            <a:endParaRPr lang="en-US" dirty="0"/>
-          </a:p>
-          <a:p>
-            <a:pPr lvl="1"/>
-            <a:r>
-              <a:rPr lang="en-US" dirty="0" smtClean="0"/>
-              <a:t>A </a:t>
-            </a:r>
-            <a:r>
               <a:rPr lang="en-US" dirty="0"/>
-              <a:t>first experience with Python</a:t>
-            </a:r>
-          </a:p>
-          <a:p>
-            <a:pPr lvl="1"/>
+              <a:t>http://</a:t>
+            </a:r>
+            <a:r>
+              <a:rPr lang="en-US" dirty="0" err="1"/>
+              <a:t>jmankoff</a:t>
+            </a:r>
+            <a:r>
+              <a:rPr lang="en-US" dirty="0" err="1" smtClean="0"/>
+              <a:t>-fusion.appspot.com</a:t>
+            </a:r>
             <a:r>
               <a:rPr lang="en-US" dirty="0"/>
-              <a:t>Learning how to acquire data from an external source</a:t>
-            </a:r>
-          </a:p>
-          <a:p>
-            <a:pPr lvl="1"/>
-            <a:r>
-              <a:rPr lang="en-US" dirty="0" smtClean="0"/>
-              <a:t>Data formats we will use: RSS format </a:t>
-            </a:r>
-          </a:p>
-          <a:p>
-            <a:pPr lvl="1"/>
-            <a:r>
-              <a:rPr lang="en-US" dirty="0" smtClean="0"/>
-              <a:t>Technologies: Forms &amp; Dynamic HTML &amp; Yahoo! Pipes</a:t>
-            </a:r>
-            <a:endParaRPr lang="en-US" dirty="0"/>
-          </a:p>
-          <a:p>
-            <a:pPr lvl="1"/>
-            <a:r>
-              <a:rPr lang="en-US" dirty="0" smtClean="0"/>
-              <a:t>Setting </a:t>
-            </a:r>
-            <a:r>
-              <a:rPr lang="en-US" dirty="0"/>
-              <a:t>up a question and deciding what data helps to answer the question.</a:t>
-            </a:r>
+              <a:t>/</a:t>
+            </a:r>
+          </a:p>
+          <a:p>
+            <a:pPr marL="0" indent="0">
+              <a:buNone/>
+            </a:pPr>
+            <a:endParaRPr lang="en-US" dirty="0"/>
           </a:p>
           <a:p>
             <a:endParaRPr lang="en-US" dirty="0"/>
@@ -9745,7 +8343,7 @@
           <a:p>
             <a:fld id="{7053BEFA-1175-F644-B249-7D41D72BD3FF}" type="datetime1">
               <a:rPr lang="en-US" smtClean="0"/>
-              <a:t>1/13/15</a:t>
+              <a:t>1/9/16</a:t>
             </a:fld>
             <a:endParaRPr lang="en-US"/>
           </a:p>
@@ -9793,6 +8391,36 @@
           </a:p>
         </p:txBody>
       </p:sp>
+      <p:pic>
+        <p:nvPicPr>
+          <p:cNvPr id="7" name="Picture 6" descr="Screen Shot 2016-01-10 at 4.40.45 PM.png"/>
+          <p:cNvPicPr>
+            <a:picLocks noChangeAspect="1"/>
+          </p:cNvPicPr>
+          <p:nvPr/>
+        </p:nvPicPr>
+        <p:blipFill>
+          <a:blip r:embed="rId2">
+            <a:extLst>
+              <a:ext uri="{28A0092B-C50C-407E-A947-70E740481C1C}">
+                <a14:useLocalDpi xmlns:a14="http://schemas.microsoft.com/office/drawing/2010/main" val="0"/>
+              </a:ext>
+            </a:extLst>
+          </a:blip>
+          <a:stretch>
+            <a:fillRect/>
+          </a:stretch>
+        </p:blipFill>
+        <p:spPr>
+          <a:xfrm>
+            <a:off x="1128943" y="3680214"/>
+            <a:ext cx="5416013" cy="3200574"/>
+          </a:xfrm>
+          <a:prstGeom prst="rect">
+            <a:avLst/>
+          </a:prstGeom>
+        </p:spPr>
+      </p:pic>
     </p:spTree>
     <p:extLst>
       <p:ext uri="{BB962C8B-B14F-4D97-AF65-F5344CB8AC3E}">
@@ -9847,7 +8475,7 @@
           <a:p>
             <a:r>
               <a:rPr lang="en-US" dirty="0" smtClean="0"/>
-              <a:t>Demo</a:t>
+              <a:t>Which Data Table?</a:t>
             </a:r>
             <a:endParaRPr lang="en-US" dirty="0"/>
           </a:p>
@@ -9868,59 +8496,22 @@
           <a:bodyPr/>
           <a:lstStyle/>
           <a:p>
-            <a:pPr marL="0" indent="0">
-              <a:buNone/>
-            </a:pPr>
-            <a:r>
-              <a:rPr lang="en-US" dirty="0"/>
-              <a:t>Yahoo Pipes End: </a:t>
+            <a:r>
+              <a:rPr lang="en-US" dirty="0">
+                <a:hlinkClick r:id="rId2"/>
+              </a:rPr>
+              <a:t>https://research.google.com/</a:t>
+            </a:r>
+            <a:r>
+              <a:rPr lang="en-US" dirty="0" smtClean="0">
+                <a:hlinkClick r:id="rId2"/>
+              </a:rPr>
+              <a:t>tables</a:t>
             </a:r>
             <a:endParaRPr lang="en-US" dirty="0" smtClean="0"/>
           </a:p>
           <a:p>
-            <a:r>
-              <a:rPr lang="en-US" dirty="0" smtClean="0"/>
-              <a:t>http</a:t>
-            </a:r>
-            <a:r>
-              <a:rPr lang="en-US" dirty="0"/>
-              <a:t>://</a:t>
-            </a:r>
-            <a:r>
-              <a:rPr lang="en-US" dirty="0" err="1"/>
-              <a:t>pipes.yahoo.com</a:t>
-            </a:r>
-            <a:r>
-              <a:rPr lang="en-US" dirty="0"/>
-              <a:t>/pipes</a:t>
-            </a:r>
-            <a:r>
-              <a:rPr lang="en-US" dirty="0" smtClean="0"/>
-              <a:t>/ </a:t>
-            </a:r>
-          </a:p>
-          <a:p>
-            <a:pPr marL="0" indent="0">
-              <a:buNone/>
-            </a:pPr>
-            <a:r>
-              <a:rPr lang="en-US" dirty="0" smtClean="0"/>
-              <a:t>Google </a:t>
-            </a:r>
-            <a:r>
-              <a:rPr lang="en-US" dirty="0" err="1" smtClean="0"/>
-              <a:t>Appspot</a:t>
-            </a:r>
-            <a:r>
-              <a:rPr lang="en-US" dirty="0" smtClean="0"/>
-              <a:t> End:</a:t>
-            </a:r>
-          </a:p>
-          <a:p>
-            <a:r>
-              <a:rPr lang="en-US" dirty="0"/>
-              <a:t>http://jmankoff-byte1.appspot.com/</a:t>
-            </a:r>
+            <a:endParaRPr lang="en-US" dirty="0"/>
           </a:p>
         </p:txBody>
       </p:sp>
@@ -9941,7 +8532,7 @@
           <a:p>
             <a:fld id="{7053BEFA-1175-F644-B249-7D41D72BD3FF}" type="datetime1">
               <a:rPr lang="en-US" smtClean="0"/>
-              <a:t>1/13/15</a:t>
+              <a:t>1/10/16</a:t>
             </a:fld>
             <a:endParaRPr lang="en-US"/>
           </a:p>
@@ -9989,23 +8580,46 @@
           </a:p>
         </p:txBody>
       </p:sp>
+      <p:pic>
+        <p:nvPicPr>
+          <p:cNvPr id="10" name="Picture 9" descr="Screen Shot 2016-01-10 at 4.51.55 PM.png"/>
+          <p:cNvPicPr>
+            <a:picLocks noChangeAspect="1"/>
+          </p:cNvPicPr>
+          <p:nvPr/>
+        </p:nvPicPr>
+        <p:blipFill>
+          <a:blip r:embed="rId3">
+            <a:extLst>
+              <a:ext uri="{28A0092B-C50C-407E-A947-70E740481C1C}">
+                <a14:useLocalDpi xmlns:a14="http://schemas.microsoft.com/office/drawing/2010/main" val="0"/>
+              </a:ext>
+            </a:extLst>
+          </a:blip>
+          <a:stretch>
+            <a:fillRect/>
+          </a:stretch>
+        </p:blipFill>
+        <p:spPr>
+          <a:xfrm>
+            <a:off x="258620" y="2535677"/>
+            <a:ext cx="9144000" cy="5271911"/>
+          </a:xfrm>
+          <a:prstGeom prst="rect">
+            <a:avLst/>
+          </a:prstGeom>
+        </p:spPr>
+      </p:pic>
     </p:spTree>
     <p:extLst>
       <p:ext uri="{BB962C8B-B14F-4D97-AF65-F5344CB8AC3E}">
-        <p14:creationId xmlns:p14="http://schemas.microsoft.com/office/powerpoint/2010/main" val="686116515"/>
+        <p14:creationId xmlns:p14="http://schemas.microsoft.com/office/powerpoint/2010/main" val="898133110"/>
       </p:ext>
     </p:extLst>
   </p:cSld>
   <p:clrMapOvr>
     <a:masterClrMapping/>
   </p:clrMapOvr>
-  <p:timing>
-    <p:tnLst>
-      <p:par>
-        <p:cTn xmlns:p14="http://schemas.microsoft.com/office/powerpoint/2010/main" id="1" dur="indefinite" restart="never" nodeType="tmRoot"/>
-      </p:par>
-    </p:tnLst>
-  </p:timing>
 </p:sld>
 </file>
 
@@ -10043,7 +8657,7 @@
           <a:p>
             <a:r>
               <a:rPr lang="en-US" dirty="0" smtClean="0"/>
-              <a:t>What can you do with Pipes?</a:t>
+              <a:t>Which Data Table?</a:t>
             </a:r>
             <a:endParaRPr lang="en-US" dirty="0"/>
           </a:p>
@@ -10065,97 +8679,21 @@
           <a:lstStyle/>
           <a:p>
             <a:r>
-              <a:rPr lang="en-US" dirty="0"/>
-              <a:t>starts with </a:t>
-            </a:r>
-            <a:r>
-              <a:rPr lang="en-US" dirty="0" smtClean="0"/>
-              <a:t>a blog feed</a:t>
-            </a:r>
-          </a:p>
-          <a:p>
-            <a:r>
-              <a:rPr lang="en-US" dirty="0" smtClean="0"/>
-              <a:t>Run links </a:t>
-            </a:r>
-            <a:r>
-              <a:rPr lang="en-US" dirty="0"/>
-              <a:t>through the </a:t>
-            </a:r>
-            <a:r>
-              <a:rPr lang="en-US" dirty="0" err="1"/>
-              <a:t>BackType</a:t>
-            </a:r>
-            <a:r>
-              <a:rPr lang="en-US" dirty="0"/>
-              <a:t> API to see who has posted the link to Twitter</a:t>
-            </a:r>
-          </a:p>
-          <a:p>
-            <a:r>
-              <a:rPr lang="en-US" dirty="0" smtClean="0"/>
-              <a:t>Use the </a:t>
-            </a:r>
-            <a:r>
-              <a:rPr lang="en-US" dirty="0"/>
-              <a:t>Twitter API to see how many followers each person who tweeted the link has</a:t>
-            </a:r>
-          </a:p>
-          <a:p>
-            <a:r>
-              <a:rPr lang="en-US" dirty="0" smtClean="0"/>
-              <a:t>Format it as RSS “</a:t>
-            </a:r>
-            <a:r>
-              <a:rPr lang="en-US" dirty="0"/>
-              <a:t>username (</a:t>
-            </a:r>
-            <a:r>
-              <a:rPr lang="en-US" dirty="0" err="1"/>
-              <a:t>num</a:t>
-            </a:r>
-            <a:r>
-              <a:rPr lang="en-US" dirty="0"/>
-              <a:t> of followers): Tweet text</a:t>
-            </a:r>
-            <a:r>
-              <a:rPr lang="en-US" dirty="0" smtClean="0"/>
-              <a:t>”</a:t>
-            </a:r>
-          </a:p>
-          <a:p>
-            <a:pPr marL="0" indent="0">
-              <a:buNone/>
-            </a:pPr>
-            <a:r>
-              <a:rPr lang="en-US" sz="2000" dirty="0" smtClean="0"/>
-              <a:t>(</a:t>
-            </a:r>
-            <a:r>
-              <a:rPr lang="en-US" sz="2000" dirty="0"/>
-              <a:t>Dawn Foster: http://</a:t>
-            </a:r>
-            <a:r>
-              <a:rPr lang="en-US" sz="2000" dirty="0" err="1"/>
-              <a:t>gigaom.com</a:t>
-            </a:r>
-            <a:r>
-              <a:rPr lang="en-US" sz="2000" dirty="0"/>
-              <a:t>/2010/10/29/using-</a:t>
-            </a:r>
-            <a:r>
-              <a:rPr lang="en-US" sz="2000" dirty="0" err="1"/>
-              <a:t>apis</a:t>
-            </a:r>
-            <a:r>
-              <a:rPr lang="en-US" sz="2000" dirty="0"/>
-              <a:t>-not-quite-as-hard-as-it-looks</a:t>
-            </a:r>
-            <a:r>
-              <a:rPr lang="en-US" sz="2000" dirty="0" smtClean="0"/>
-              <a:t>/)</a:t>
-            </a:r>
-            <a:endParaRPr lang="en-US" sz="2000" dirty="0"/>
+              <a:rPr lang="en-US" dirty="0">
+                <a:hlinkClick r:id="rId2"/>
+              </a:rPr>
+              <a:t>https://research.google.com/</a:t>
+            </a:r>
+            <a:r>
+              <a:rPr lang="en-US" dirty="0" smtClean="0">
+                <a:hlinkClick r:id="rId2"/>
+              </a:rPr>
+              <a:t>tables</a:t>
+            </a:r>
+            <a:endParaRPr lang="en-US" dirty="0" smtClean="0"/>
+          </a:p>
+          <a:p>
+            <a:endParaRPr lang="en-US" dirty="0"/>
           </a:p>
         </p:txBody>
       </p:sp>
@@ -10176,7 +8714,7 @@
           <a:p>
             <a:fld id="{7053BEFA-1175-F644-B249-7D41D72BD3FF}" type="datetime1">
               <a:rPr lang="en-US" smtClean="0"/>
-              <a:t>1/13/15</a:t>
+              <a:t>1/10/16</a:t>
             </a:fld>
             <a:endParaRPr lang="en-US"/>
           </a:p>
@@ -10224,23 +8762,46 @@
           </a:p>
         </p:txBody>
       </p:sp>
+      <p:pic>
+        <p:nvPicPr>
+          <p:cNvPr id="8" name="Picture 7" descr="Screen Shot 2016-01-10 at 4.52.42 PM.png"/>
+          <p:cNvPicPr>
+            <a:picLocks noChangeAspect="1"/>
+          </p:cNvPicPr>
+          <p:nvPr/>
+        </p:nvPicPr>
+        <p:blipFill>
+          <a:blip r:embed="rId3">
+            <a:extLst>
+              <a:ext uri="{28A0092B-C50C-407E-A947-70E740481C1C}">
+                <a14:useLocalDpi xmlns:a14="http://schemas.microsoft.com/office/drawing/2010/main" val="0"/>
+              </a:ext>
+            </a:extLst>
+          </a:blip>
+          <a:stretch>
+            <a:fillRect/>
+          </a:stretch>
+        </p:blipFill>
+        <p:spPr>
+          <a:xfrm>
+            <a:off x="0" y="2468327"/>
+            <a:ext cx="9004300" cy="4292600"/>
+          </a:xfrm>
+          <a:prstGeom prst="rect">
+            <a:avLst/>
+          </a:prstGeom>
+        </p:spPr>
+      </p:pic>
     </p:spTree>
     <p:extLst>
       <p:ext uri="{BB962C8B-B14F-4D97-AF65-F5344CB8AC3E}">
-        <p14:creationId xmlns:p14="http://schemas.microsoft.com/office/powerpoint/2010/main" val="2575752970"/>
+        <p14:creationId xmlns:p14="http://schemas.microsoft.com/office/powerpoint/2010/main" val="2918079734"/>
       </p:ext>
     </p:extLst>
   </p:cSld>
   <p:clrMapOvr>
     <a:masterClrMapping/>
   </p:clrMapOvr>
-  <p:timing>
-    <p:tnLst>
-      <p:par>
-        <p:cTn xmlns:p14="http://schemas.microsoft.com/office/powerpoint/2010/main" id="1" dur="indefinite" restart="never" nodeType="tmRoot"/>
-      </p:par>
-    </p:tnLst>
-  </p:timing>
 </p:sld>
 </file>
 
@@ -10278,90 +8839,49 @@
           <a:p>
             <a:r>
               <a:rPr lang="en-US" dirty="0" smtClean="0"/>
-              <a:t>What can you do with Python?</a:t>
-            </a:r>
-            <a:endParaRPr lang="en-US" dirty="0"/>
-          </a:p>
-        </p:txBody>
-      </p:sp>
-      <p:sp>
-        <p:nvSpPr>
-          <p:cNvPr id="3" name="Content Placeholder 2"/>
-          <p:cNvSpPr>
-            <a:spLocks noGrp="1"/>
-          </p:cNvSpPr>
+              <a:t>How does </a:t>
+            </a:r>
+            <a:r>
+              <a:rPr lang="en-US" dirty="0" err="1" smtClean="0"/>
+              <a:t>Appspot</a:t>
+            </a:r>
+            <a:r>
+              <a:rPr lang="en-US" smtClean="0"/>
+              <a:t> work</a:t>
+            </a:r>
+            <a:r>
+              <a:rPr lang="en-US" dirty="0" smtClean="0"/>
+              <a:t>?</a:t>
+            </a:r>
+            <a:endParaRPr lang="en-US" dirty="0"/>
+          </a:p>
+        </p:txBody>
+      </p:sp>
+      <p:pic>
+        <p:nvPicPr>
+          <p:cNvPr id="7" name="Content Placeholder 6" descr="Screen Shot 2014-01-06 at 6.04.53 PM.png"/>
+          <p:cNvPicPr>
+            <a:picLocks noGrp="1" noChangeAspect="1"/>
+          </p:cNvPicPr>
           <p:nvPr>
             <p:ph idx="1"/>
           </p:nvPr>
-        </p:nvSpPr>
+        </p:nvPicPr>
+        <p:blipFill>
+          <a:blip r:embed="rId2">
+            <a:extLst>
+              <a:ext uri="{28A0092B-C50C-407E-A947-70E740481C1C}">
+                <a14:useLocalDpi xmlns:a14="http://schemas.microsoft.com/office/drawing/2010/main" val="0"/>
+              </a:ext>
+            </a:extLst>
+          </a:blip>
+          <a:srcRect l="334" r="334"/>
+          <a:stretch>
+            <a:fillRect/>
+          </a:stretch>
+        </p:blipFill>
         <p:spPr/>
-        <p:txBody>
-          <a:bodyPr/>
-          <a:lstStyle/>
-          <a:p>
-            <a:r>
-              <a:rPr lang="en-US" dirty="0"/>
-              <a:t>Pretty it up </a:t>
-            </a:r>
-            <a:r>
-              <a:rPr lang="en-US" dirty="0">
-                <a:hlinkClick r:id="rId2"/>
-              </a:rPr>
-              <a:t>http://jianf-byte1.appspot.com</a:t>
-            </a:r>
-            <a:r>
-              <a:rPr lang="en-US" dirty="0" smtClean="0">
-                <a:hlinkClick r:id="rId2"/>
-              </a:rPr>
-              <a:t>/</a:t>
-            </a:r>
-            <a:endParaRPr lang="en-US" dirty="0" smtClean="0"/>
-          </a:p>
-          <a:p>
-            <a:r>
-              <a:rPr lang="en-US" dirty="0"/>
-              <a:t>Calculate something: </a:t>
-            </a:r>
-            <a:r>
-              <a:rPr lang="en-US" dirty="0">
-                <a:hlinkClick r:id="rId3"/>
-              </a:rPr>
-              <a:t>http://halkutka-byte1.appspot.com/</a:t>
-            </a:r>
-            <a:r>
-              <a:rPr lang="en-US" dirty="0" smtClean="0">
-                <a:hlinkClick r:id="rId3"/>
-              </a:rPr>
-              <a:t>search</a:t>
-            </a:r>
-            <a:endParaRPr lang="en-US" dirty="0" smtClean="0"/>
-          </a:p>
-          <a:p>
-            <a:r>
-              <a:rPr lang="en-US" dirty="0" smtClean="0"/>
-              <a:t>Visualize something:</a:t>
-            </a:r>
-          </a:p>
-          <a:p>
-            <a:r>
-              <a:rPr lang="en-US" dirty="0">
-                <a:hlinkClick r:id="rId4"/>
-              </a:rPr>
-              <a:t>http://psureshk-byte1.appspot.com/</a:t>
-            </a:r>
-            <a:r>
-              <a:rPr lang="en-US" dirty="0" smtClean="0">
-                <a:hlinkClick r:id="rId4"/>
-              </a:rPr>
-              <a:t>search</a:t>
-            </a:r>
-            <a:endParaRPr lang="en-US" dirty="0" smtClean="0"/>
-          </a:p>
-          <a:p>
-            <a:endParaRPr lang="en-US" dirty="0"/>
-          </a:p>
-        </p:txBody>
-      </p:sp>
+      </p:pic>
       <p:sp>
         <p:nvSpPr>
           <p:cNvPr id="4" name="Date Placeholder 3"/>
@@ -10379,7 +8899,7 @@
           <a:p>
             <a:fld id="{7053BEFA-1175-F644-B249-7D41D72BD3FF}" type="datetime1">
               <a:rPr lang="en-US" smtClean="0"/>
-              <a:t>1/13/15</a:t>
+              <a:t>1/9/16</a:t>
             </a:fld>
             <a:endParaRPr lang="en-US"/>
           </a:p>
@@ -10430,7 +8950,7 @@
     </p:spTree>
     <p:extLst>
       <p:ext uri="{BB962C8B-B14F-4D97-AF65-F5344CB8AC3E}">
-        <p14:creationId xmlns:p14="http://schemas.microsoft.com/office/powerpoint/2010/main" val="4082363200"/>
+        <p14:creationId xmlns:p14="http://schemas.microsoft.com/office/powerpoint/2010/main" val="3450769577"/>
       </p:ext>
     </p:extLst>
   </p:cSld>
@@ -10481,19 +9001,7 @@
           <a:p>
             <a:r>
               <a:rPr lang="en-US" dirty="0" smtClean="0"/>
-              <a:t>How does </a:t>
-            </a:r>
-            <a:r>
-              <a:rPr lang="en-US" dirty="0" err="1" smtClean="0"/>
-              <a:t>Appspot</a:t>
-            </a:r>
-            <a:r>
-              <a:rPr lang="en-US" smtClean="0"/>
-              <a:t> work</a:t>
-            </a:r>
-            <a:r>
-              <a:rPr lang="en-US" dirty="0" smtClean="0"/>
-              <a:t>?</a:t>
+              <a:t>HTML</a:t>
             </a:r>
             <a:endParaRPr lang="en-US" dirty="0"/>
           </a:p>
@@ -10501,7 +9009,7 @@
       </p:sp>
       <p:pic>
         <p:nvPicPr>
-          <p:cNvPr id="7" name="Content Placeholder 6" descr="Screen Shot 2014-01-06 at 6.04.53 PM.png"/>
+          <p:cNvPr id="7" name="Content Placeholder 6" descr="Screen Shot 2014-01-06 at 6.06.38 PM.png"/>
           <p:cNvPicPr>
             <a:picLocks noGrp="1" noChangeAspect="1"/>
           </p:cNvPicPr>
@@ -10517,12 +9025,17 @@
               </a:ext>
             </a:extLst>
           </a:blip>
-          <a:srcRect l="334" r="334"/>
+          <a:srcRect l="-22817" r="-22817"/>
           <a:stretch>
             <a:fillRect/>
           </a:stretch>
         </p:blipFill>
-        <p:spPr/>
+        <p:spPr>
+          <a:xfrm>
+            <a:off x="1128713" y="1847850"/>
+            <a:ext cx="7048500" cy="4379913"/>
+          </a:xfrm>
+        </p:spPr>
       </p:pic>
       <p:sp>
         <p:nvSpPr>
@@ -10541,7 +9054,7 @@
           <a:p>
             <a:fld id="{7053BEFA-1175-F644-B249-7D41D72BD3FF}" type="datetime1">
               <a:rPr lang="en-US" smtClean="0"/>
-              <a:t>1/13/15</a:t>
+              <a:t>1/9/16</a:t>
             </a:fld>
             <a:endParaRPr lang="en-US"/>
           </a:p>
@@ -10592,7 +9105,7 @@
     </p:spTree>
     <p:extLst>
       <p:ext uri="{BB962C8B-B14F-4D97-AF65-F5344CB8AC3E}">
-        <p14:creationId xmlns:p14="http://schemas.microsoft.com/office/powerpoint/2010/main" val="3450769577"/>
+        <p14:creationId xmlns:p14="http://schemas.microsoft.com/office/powerpoint/2010/main" val="460783256"/>
       </p:ext>
     </p:extLst>
   </p:cSld>
@@ -10643,563 +9156,141 @@
           <a:p>
             <a:r>
               <a:rPr lang="en-US" dirty="0" smtClean="0"/>
-              <a:t>HTML</a:t>
-            </a:r>
-            <a:endParaRPr lang="en-US" dirty="0"/>
-          </a:p>
-        </p:txBody>
-      </p:sp>
-      <p:pic>
-        <p:nvPicPr>
-          <p:cNvPr id="7" name="Content Placeholder 6" descr="Screen Shot 2014-01-06 at 6.06.38 PM.png"/>
-          <p:cNvPicPr>
-            <a:picLocks noGrp="1" noChangeAspect="1"/>
-          </p:cNvPicPr>
+              <a:t>Hints and Requests</a:t>
+            </a:r>
+            <a:endParaRPr lang="en-US" dirty="0"/>
+          </a:p>
+        </p:txBody>
+      </p:sp>
+      <p:sp>
+        <p:nvSpPr>
+          <p:cNvPr id="3" name="Date Placeholder 2"/>
+          <p:cNvSpPr>
+            <a:spLocks noGrp="1"/>
+          </p:cNvSpPr>
+          <p:nvPr>
+            <p:ph type="dt" sz="half" idx="10"/>
+          </p:nvPr>
+        </p:nvSpPr>
+        <p:spPr/>
+        <p:txBody>
+          <a:bodyPr/>
+          <a:lstStyle/>
+          <a:p>
+            <a:fld id="{FA3C144B-2939-9A49-B014-915EC3E81866}" type="datetime1">
+              <a:rPr lang="en-US" smtClean="0"/>
+              <a:pPr/>
+              <a:t>1/9/16</a:t>
+            </a:fld>
+            <a:endParaRPr lang="en-US" dirty="0"/>
+          </a:p>
+        </p:txBody>
+      </p:sp>
+      <p:sp>
+        <p:nvSpPr>
+          <p:cNvPr id="4" name="Footer Placeholder 3"/>
+          <p:cNvSpPr>
+            <a:spLocks noGrp="1"/>
+          </p:cNvSpPr>
+          <p:nvPr>
+            <p:ph type="ftr" sz="quarter" idx="11"/>
+          </p:nvPr>
+        </p:nvSpPr>
+        <p:spPr/>
+        <p:txBody>
+          <a:bodyPr/>
+          <a:lstStyle/>
+          <a:p>
+            <a:endParaRPr lang="en-US" dirty="0"/>
+          </a:p>
+        </p:txBody>
+      </p:sp>
+      <p:sp>
+        <p:nvSpPr>
+          <p:cNvPr id="5" name="Slide Number Placeholder 4"/>
+          <p:cNvSpPr>
+            <a:spLocks noGrp="1"/>
+          </p:cNvSpPr>
+          <p:nvPr>
+            <p:ph type="sldNum" sz="quarter" idx="12"/>
+          </p:nvPr>
+        </p:nvSpPr>
+        <p:spPr/>
+        <p:txBody>
+          <a:bodyPr/>
+          <a:lstStyle/>
+          <a:p>
+            <a:fld id="{17E276FA-8F89-B34D-A726-BE3FA1F8DD97}" type="slidenum">
+              <a:rPr lang="en-US" smtClean="0"/>
+              <a:pPr/>
+              <a:t>7</a:t>
+            </a:fld>
+            <a:endParaRPr lang="en-US" dirty="0"/>
+          </a:p>
+        </p:txBody>
+      </p:sp>
+      <p:sp>
+        <p:nvSpPr>
+          <p:cNvPr id="6" name="Content Placeholder 5"/>
+          <p:cNvSpPr>
+            <a:spLocks noGrp="1"/>
+          </p:cNvSpPr>
           <p:nvPr>
             <p:ph idx="1"/>
           </p:nvPr>
-        </p:nvPicPr>
-        <p:blipFill>
-          <a:blip r:embed="rId2">
-            <a:extLst>
-              <a:ext uri="{28A0092B-C50C-407E-A947-70E740481C1C}">
-                <a14:useLocalDpi xmlns:a14="http://schemas.microsoft.com/office/drawing/2010/main" val="0"/>
-              </a:ext>
-            </a:extLst>
-          </a:blip>
-          <a:srcRect l="-22817" r="-22817"/>
-          <a:stretch>
-            <a:fillRect/>
-          </a:stretch>
-        </p:blipFill>
+        </p:nvSpPr>
         <p:spPr>
           <a:xfrm>
-            <a:off x="1128713" y="1847850"/>
-            <a:ext cx="7048500" cy="4379913"/>
+            <a:off x="1119720" y="1623065"/>
+            <a:ext cx="7110947" cy="4379976"/>
           </a:xfrm>
         </p:spPr>
-      </p:pic>
-      <p:sp>
-        <p:nvSpPr>
-          <p:cNvPr id="4" name="Date Placeholder 3"/>
-          <p:cNvSpPr>
-            <a:spLocks noGrp="1"/>
-          </p:cNvSpPr>
-          <p:nvPr>
-            <p:ph type="dt" sz="half" idx="10"/>
-          </p:nvPr>
-        </p:nvSpPr>
-        <p:spPr/>
-        <p:txBody>
-          <a:bodyPr/>
-          <a:lstStyle/>
-          <a:p>
-            <a:fld id="{7053BEFA-1175-F644-B249-7D41D72BD3FF}" type="datetime1">
+        <p:txBody>
+          <a:bodyPr/>
+          <a:lstStyle/>
+          <a:p>
+            <a:r>
+              <a:rPr lang="en-US" dirty="0" smtClean="0"/>
+              <a:t>Be sure to follow the tutorial step by step. </a:t>
+            </a:r>
+          </a:p>
+          <a:p>
+            <a:r>
+              <a:rPr lang="en-US" dirty="0" smtClean="0"/>
+              <a:t>Leave </a:t>
+            </a:r>
+            <a:r>
+              <a:rPr lang="en-US" dirty="0" smtClean="0"/>
+              <a:t>enough time to work out the kinks – even with a tutorial and source code you will run into some.</a:t>
+            </a:r>
+          </a:p>
+          <a:p>
+            <a:r>
+              <a:rPr lang="en-US" dirty="0" smtClean="0"/>
+              <a:t>Questions and answers are most welcome as comments on the tutorial so we all benefit</a:t>
+            </a:r>
+            <a:r>
+              <a:rPr lang="en-US" dirty="0" smtClean="0"/>
+              <a:t>.</a:t>
+            </a:r>
+          </a:p>
+          <a:p>
+            <a:r>
+              <a:rPr lang="en-US" dirty="0" smtClean="0"/>
+              <a:t>Most of your time should be spent working on your data and what question you are answering </a:t>
+            </a:r>
+            <a:r>
               <a:rPr lang="en-US" smtClean="0"/>
-              <a:t>1/13/15</a:t>
-            </a:fld>
-            <a:endParaRPr lang="en-US"/>
-          </a:p>
-        </p:txBody>
-      </p:sp>
-      <p:sp>
-        <p:nvSpPr>
-          <p:cNvPr id="5" name="Footer Placeholder 4"/>
-          <p:cNvSpPr>
-            <a:spLocks noGrp="1"/>
-          </p:cNvSpPr>
-          <p:nvPr>
-            <p:ph type="ftr" sz="quarter" idx="11"/>
-          </p:nvPr>
-        </p:nvSpPr>
-        <p:spPr/>
-        <p:txBody>
-          <a:bodyPr/>
-          <a:lstStyle/>
-          <a:p>
-            <a:endParaRPr lang="en-US" dirty="0"/>
-          </a:p>
-        </p:txBody>
-      </p:sp>
-      <p:sp>
-        <p:nvSpPr>
-          <p:cNvPr id="6" name="Slide Number Placeholder 5"/>
-          <p:cNvSpPr>
-            <a:spLocks noGrp="1"/>
-          </p:cNvSpPr>
-          <p:nvPr>
-            <p:ph type="sldNum" sz="quarter" idx="12"/>
-          </p:nvPr>
-        </p:nvSpPr>
-        <p:spPr/>
-        <p:txBody>
-          <a:bodyPr/>
-          <a:lstStyle/>
-          <a:p>
-            <a:fld id="{17E276FA-8F89-B34D-A726-BE3FA1F8DD97}" type="slidenum">
-              <a:rPr lang="en-US" smtClean="0"/>
-              <a:t>7</a:t>
-            </a:fld>
-            <a:endParaRPr lang="en-US" dirty="0"/>
+              <a:t>with it</a:t>
+            </a:r>
+            <a:endParaRPr lang="en-US" dirty="0" smtClean="0"/>
           </a:p>
         </p:txBody>
       </p:sp>
     </p:spTree>
     <p:extLst>
       <p:ext uri="{BB962C8B-B14F-4D97-AF65-F5344CB8AC3E}">
-        <p14:creationId xmlns:p14="http://schemas.microsoft.com/office/powerpoint/2010/main" val="460783256"/>
-      </p:ext>
-    </p:extLst>
-  </p:cSld>
-  <p:clrMapOvr>
-    <a:masterClrMapping/>
-  </p:clrMapOvr>
-  <p:timing>
-    <p:tnLst>
-      <p:par>
-        <p:cTn xmlns:p14="http://schemas.microsoft.com/office/powerpoint/2010/main" id="1" dur="indefinite" restart="never" nodeType="tmRoot"/>
-      </p:par>
-    </p:tnLst>
-  </p:timing>
-</p:sld>
-</file>
-
-<file path=ppt/slides/slide8.xml><?xml version="1.0" encoding="utf-8"?>
-<p:sld xmlns:a="http://schemas.openxmlformats.org/drawingml/2006/main" xmlns:r="http://schemas.openxmlformats.org/officeDocument/2006/relationships" xmlns:p="http://schemas.openxmlformats.org/presentationml/2006/main">
-  <p:cSld>
-    <p:spTree>
-      <p:nvGrpSpPr>
-        <p:cNvPr id="1" name=""/>
-        <p:cNvGrpSpPr/>
-        <p:nvPr/>
-      </p:nvGrpSpPr>
-      <p:grpSpPr>
-        <a:xfrm>
-          <a:off x="0" y="0"/>
-          <a:ext cx="0" cy="0"/>
-          <a:chOff x="0" y="0"/>
-          <a:chExt cx="0" cy="0"/>
-        </a:xfrm>
-      </p:grpSpPr>
-      <p:sp>
-        <p:nvSpPr>
-          <p:cNvPr id="2" name="Title 1"/>
-          <p:cNvSpPr>
-            <a:spLocks noGrp="1"/>
-          </p:cNvSpPr>
-          <p:nvPr>
-            <p:ph type="title"/>
-          </p:nvPr>
-        </p:nvSpPr>
-        <p:spPr/>
-        <p:txBody>
-          <a:bodyPr/>
-          <a:lstStyle/>
-          <a:p>
-            <a:r>
-              <a:rPr lang="en-US" dirty="0" smtClean="0"/>
-              <a:t>HTML</a:t>
-            </a:r>
-            <a:endParaRPr lang="en-US" dirty="0"/>
-          </a:p>
-        </p:txBody>
-      </p:sp>
-      <p:pic>
-        <p:nvPicPr>
-          <p:cNvPr id="7" name="Content Placeholder 6" descr="Screen Shot 2014-01-06 at 6.06.38 PM.png"/>
-          <p:cNvPicPr>
-            <a:picLocks noGrp="1" noChangeAspect="1"/>
-          </p:cNvPicPr>
-          <p:nvPr>
-            <p:ph idx="1"/>
-          </p:nvPr>
-        </p:nvPicPr>
-        <p:blipFill>
-          <a:blip r:embed="rId2">
-            <a:extLst>
-              <a:ext uri="{28A0092B-C50C-407E-A947-70E740481C1C}">
-                <a14:useLocalDpi xmlns:a14="http://schemas.microsoft.com/office/drawing/2010/main" val="0"/>
-              </a:ext>
-            </a:extLst>
-          </a:blip>
-          <a:srcRect l="-22817" r="-22817"/>
-          <a:stretch>
-            <a:fillRect/>
-          </a:stretch>
-        </p:blipFill>
-        <p:spPr>
-          <a:xfrm>
-            <a:off x="1128713" y="1847850"/>
-            <a:ext cx="7048500" cy="4379913"/>
-          </a:xfrm>
-        </p:spPr>
-      </p:pic>
-      <p:sp>
-        <p:nvSpPr>
-          <p:cNvPr id="4" name="Date Placeholder 3"/>
-          <p:cNvSpPr>
-            <a:spLocks noGrp="1"/>
-          </p:cNvSpPr>
-          <p:nvPr>
-            <p:ph type="dt" sz="half" idx="10"/>
-          </p:nvPr>
-        </p:nvSpPr>
-        <p:spPr/>
-        <p:txBody>
-          <a:bodyPr/>
-          <a:lstStyle/>
-          <a:p>
-            <a:fld id="{7053BEFA-1175-F644-B249-7D41D72BD3FF}" type="datetime1">
-              <a:rPr lang="en-US" smtClean="0"/>
-              <a:t>1/13/15</a:t>
-            </a:fld>
-            <a:endParaRPr lang="en-US"/>
-          </a:p>
-        </p:txBody>
-      </p:sp>
-      <p:sp>
-        <p:nvSpPr>
-          <p:cNvPr id="5" name="Footer Placeholder 4"/>
-          <p:cNvSpPr>
-            <a:spLocks noGrp="1"/>
-          </p:cNvSpPr>
-          <p:nvPr>
-            <p:ph type="ftr" sz="quarter" idx="11"/>
-          </p:nvPr>
-        </p:nvSpPr>
-        <p:spPr/>
-        <p:txBody>
-          <a:bodyPr/>
-          <a:lstStyle/>
-          <a:p>
-            <a:endParaRPr lang="en-US" dirty="0"/>
-          </a:p>
-        </p:txBody>
-      </p:sp>
-      <p:sp>
-        <p:nvSpPr>
-          <p:cNvPr id="6" name="Slide Number Placeholder 5"/>
-          <p:cNvSpPr>
-            <a:spLocks noGrp="1"/>
-          </p:cNvSpPr>
-          <p:nvPr>
-            <p:ph type="sldNum" sz="quarter" idx="12"/>
-          </p:nvPr>
-        </p:nvSpPr>
-        <p:spPr/>
-        <p:txBody>
-          <a:bodyPr/>
-          <a:lstStyle/>
-          <a:p>
-            <a:fld id="{17E276FA-8F89-B34D-A726-BE3FA1F8DD97}" type="slidenum">
-              <a:rPr lang="en-US" smtClean="0"/>
-              <a:t>8</a:t>
-            </a:fld>
-            <a:endParaRPr lang="en-US" dirty="0"/>
-          </a:p>
-        </p:txBody>
-      </p:sp>
-      <p:sp>
-        <p:nvSpPr>
-          <p:cNvPr id="3" name="Rectangle 2"/>
-          <p:cNvSpPr/>
-          <p:nvPr/>
-        </p:nvSpPr>
-        <p:spPr>
-          <a:xfrm>
-            <a:off x="4844106" y="3295948"/>
-            <a:ext cx="2390467" cy="606903"/>
-          </a:xfrm>
-          <a:prstGeom prst="rect">
-            <a:avLst/>
-          </a:prstGeom>
-          <a:noFill/>
-        </p:spPr>
-        <p:style>
-          <a:lnRef idx="2">
-            <a:schemeClr val="accent1"/>
-          </a:lnRef>
-          <a:fillRef idx="1">
-            <a:schemeClr val="lt1"/>
-          </a:fillRef>
-          <a:effectRef idx="0">
-            <a:schemeClr val="accent1"/>
-          </a:effectRef>
-          <a:fontRef idx="minor">
-            <a:schemeClr val="dk1"/>
-          </a:fontRef>
-        </p:style>
-        <p:txBody>
-          <a:bodyPr rtlCol="0" anchor="ctr"/>
-          <a:lstStyle/>
-          <a:p>
-            <a:pPr algn="ctr"/>
-            <a:endParaRPr lang="en-US"/>
-          </a:p>
-        </p:txBody>
-      </p:sp>
-      <p:sp>
-        <p:nvSpPr>
-          <p:cNvPr id="8" name="TextBox 7"/>
-          <p:cNvSpPr txBox="1"/>
-          <p:nvPr/>
-        </p:nvSpPr>
-        <p:spPr>
-          <a:xfrm>
-            <a:off x="4844106" y="2051365"/>
-            <a:ext cx="2670599" cy="1200329"/>
-          </a:xfrm>
-          <a:prstGeom prst="rect">
-            <a:avLst/>
-          </a:prstGeom>
-          <a:solidFill>
-            <a:schemeClr val="bg1"/>
-          </a:solidFill>
-        </p:spPr>
-        <p:txBody>
-          <a:bodyPr wrap="square" rtlCol="0">
-            <a:spAutoFit/>
-          </a:bodyPr>
-          <a:lstStyle/>
-          <a:p>
-            <a:r>
-              <a:rPr lang="en-US" dirty="0" smtClean="0"/>
-              <a:t>{{&lt;name&gt;}} is replaced with the value of that variable in your python code </a:t>
-            </a:r>
-            <a:endParaRPr lang="en-US" dirty="0"/>
-          </a:p>
-        </p:txBody>
-      </p:sp>
-    </p:spTree>
-    <p:extLst>
-      <p:ext uri="{BB962C8B-B14F-4D97-AF65-F5344CB8AC3E}">
-        <p14:creationId xmlns:p14="http://schemas.microsoft.com/office/powerpoint/2010/main" val="1612097564"/>
-      </p:ext>
-    </p:extLst>
-  </p:cSld>
-  <p:clrMapOvr>
-    <a:masterClrMapping/>
-  </p:clrMapOvr>
-  <p:timing>
-    <p:tnLst>
-      <p:par>
-        <p:cTn xmlns:p14="http://schemas.microsoft.com/office/powerpoint/2010/main" id="1" dur="indefinite" restart="never" nodeType="tmRoot"/>
-      </p:par>
-    </p:tnLst>
-  </p:timing>
-</p:sld>
-</file>
-
-<file path=ppt/slides/slide9.xml><?xml version="1.0" encoding="utf-8"?>
-<p:sld xmlns:a="http://schemas.openxmlformats.org/drawingml/2006/main" xmlns:r="http://schemas.openxmlformats.org/officeDocument/2006/relationships" xmlns:p="http://schemas.openxmlformats.org/presentationml/2006/main">
-  <p:cSld>
-    <p:spTree>
-      <p:nvGrpSpPr>
-        <p:cNvPr id="1" name=""/>
-        <p:cNvGrpSpPr/>
-        <p:nvPr/>
-      </p:nvGrpSpPr>
-      <p:grpSpPr>
-        <a:xfrm>
-          <a:off x="0" y="0"/>
-          <a:ext cx="0" cy="0"/>
-          <a:chOff x="0" y="0"/>
-          <a:chExt cx="0" cy="0"/>
-        </a:xfrm>
-      </p:grpSpPr>
-      <p:sp>
-        <p:nvSpPr>
-          <p:cNvPr id="2" name="Title 1"/>
-          <p:cNvSpPr>
-            <a:spLocks noGrp="1"/>
-          </p:cNvSpPr>
-          <p:nvPr>
-            <p:ph type="title"/>
-          </p:nvPr>
-        </p:nvSpPr>
-        <p:spPr/>
-        <p:txBody>
-          <a:bodyPr/>
-          <a:lstStyle/>
-          <a:p>
-            <a:r>
-              <a:rPr lang="en-US" dirty="0" smtClean="0"/>
-              <a:t>HTML</a:t>
-            </a:r>
-            <a:endParaRPr lang="en-US" dirty="0"/>
-          </a:p>
-        </p:txBody>
-      </p:sp>
-      <p:pic>
-        <p:nvPicPr>
-          <p:cNvPr id="7" name="Content Placeholder 6" descr="Screen Shot 2014-01-06 at 6.06.38 PM.png"/>
-          <p:cNvPicPr>
-            <a:picLocks noGrp="1" noChangeAspect="1"/>
-          </p:cNvPicPr>
-          <p:nvPr>
-            <p:ph idx="1"/>
-          </p:nvPr>
-        </p:nvPicPr>
-        <p:blipFill>
-          <a:blip r:embed="rId2">
-            <a:extLst>
-              <a:ext uri="{28A0092B-C50C-407E-A947-70E740481C1C}">
-                <a14:useLocalDpi xmlns:a14="http://schemas.microsoft.com/office/drawing/2010/main" val="0"/>
-              </a:ext>
-            </a:extLst>
-          </a:blip>
-          <a:srcRect l="-22817" r="-22817"/>
-          <a:stretch>
-            <a:fillRect/>
-          </a:stretch>
-        </p:blipFill>
-        <p:spPr>
-          <a:xfrm>
-            <a:off x="1128713" y="1847850"/>
-            <a:ext cx="7048500" cy="4379913"/>
-          </a:xfrm>
-        </p:spPr>
-      </p:pic>
-      <p:sp>
-        <p:nvSpPr>
-          <p:cNvPr id="4" name="Date Placeholder 3"/>
-          <p:cNvSpPr>
-            <a:spLocks noGrp="1"/>
-          </p:cNvSpPr>
-          <p:nvPr>
-            <p:ph type="dt" sz="half" idx="10"/>
-          </p:nvPr>
-        </p:nvSpPr>
-        <p:spPr/>
-        <p:txBody>
-          <a:bodyPr/>
-          <a:lstStyle/>
-          <a:p>
-            <a:fld id="{7053BEFA-1175-F644-B249-7D41D72BD3FF}" type="datetime1">
-              <a:rPr lang="en-US" smtClean="0"/>
-              <a:t>1/13/15</a:t>
-            </a:fld>
-            <a:endParaRPr lang="en-US"/>
-          </a:p>
-        </p:txBody>
-      </p:sp>
-      <p:sp>
-        <p:nvSpPr>
-          <p:cNvPr id="5" name="Footer Placeholder 4"/>
-          <p:cNvSpPr>
-            <a:spLocks noGrp="1"/>
-          </p:cNvSpPr>
-          <p:nvPr>
-            <p:ph type="ftr" sz="quarter" idx="11"/>
-          </p:nvPr>
-        </p:nvSpPr>
-        <p:spPr/>
-        <p:txBody>
-          <a:bodyPr/>
-          <a:lstStyle/>
-          <a:p>
-            <a:endParaRPr lang="en-US" dirty="0"/>
-          </a:p>
-        </p:txBody>
-      </p:sp>
-      <p:sp>
-        <p:nvSpPr>
-          <p:cNvPr id="6" name="Slide Number Placeholder 5"/>
-          <p:cNvSpPr>
-            <a:spLocks noGrp="1"/>
-          </p:cNvSpPr>
-          <p:nvPr>
-            <p:ph type="sldNum" sz="quarter" idx="12"/>
-          </p:nvPr>
-        </p:nvSpPr>
-        <p:spPr/>
-        <p:txBody>
-          <a:bodyPr/>
-          <a:lstStyle/>
-          <a:p>
-            <a:fld id="{17E276FA-8F89-B34D-A726-BE3FA1F8DD97}" type="slidenum">
-              <a:rPr lang="en-US" smtClean="0"/>
-              <a:t>9</a:t>
-            </a:fld>
-            <a:endParaRPr lang="en-US" dirty="0"/>
-          </a:p>
-        </p:txBody>
-      </p:sp>
-      <p:sp>
-        <p:nvSpPr>
-          <p:cNvPr id="3" name="Rectangle 2"/>
-          <p:cNvSpPr/>
-          <p:nvPr/>
-        </p:nvSpPr>
-        <p:spPr>
-          <a:xfrm>
-            <a:off x="1960929" y="3697438"/>
-            <a:ext cx="2932056" cy="802979"/>
-          </a:xfrm>
-          <a:prstGeom prst="rect">
-            <a:avLst/>
-          </a:prstGeom>
-          <a:noFill/>
-        </p:spPr>
-        <p:style>
-          <a:lnRef idx="2">
-            <a:schemeClr val="accent1"/>
-          </a:lnRef>
-          <a:fillRef idx="1">
-            <a:schemeClr val="lt1"/>
-          </a:fillRef>
-          <a:effectRef idx="0">
-            <a:schemeClr val="accent1"/>
-          </a:effectRef>
-          <a:fontRef idx="minor">
-            <a:schemeClr val="dk1"/>
-          </a:fontRef>
-        </p:style>
-        <p:txBody>
-          <a:bodyPr rtlCol="0" anchor="ctr"/>
-          <a:lstStyle/>
-          <a:p>
-            <a:pPr algn="ctr"/>
-            <a:endParaRPr lang="en-US"/>
-          </a:p>
-        </p:txBody>
-      </p:sp>
-      <p:sp>
-        <p:nvSpPr>
-          <p:cNvPr id="8" name="TextBox 7"/>
-          <p:cNvSpPr txBox="1"/>
-          <p:nvPr/>
-        </p:nvSpPr>
-        <p:spPr>
-          <a:xfrm>
-            <a:off x="1968076" y="2441087"/>
-            <a:ext cx="2670599" cy="1200329"/>
-          </a:xfrm>
-          <a:prstGeom prst="rect">
-            <a:avLst/>
-          </a:prstGeom>
-          <a:solidFill>
-            <a:schemeClr val="bg1"/>
-          </a:solidFill>
-        </p:spPr>
-        <p:txBody>
-          <a:bodyPr wrap="square" rtlCol="0">
-            <a:spAutoFit/>
-          </a:bodyPr>
-          <a:lstStyle/>
-          <a:p>
-            <a:r>
-              <a:rPr lang="en-US" dirty="0" smtClean="0"/>
-              <a:t>{%  %}  executes logic (and may also refer to variables). Here we have an if then statement</a:t>
-            </a:r>
-            <a:endParaRPr lang="en-US" dirty="0"/>
-          </a:p>
-        </p:txBody>
-      </p:sp>
-    </p:spTree>
-    <p:extLst>
-      <p:ext uri="{BB962C8B-B14F-4D97-AF65-F5344CB8AC3E}">
-        <p14:creationId xmlns:p14="http://schemas.microsoft.com/office/powerpoint/2010/main" val="657019898"/>
+        <p14:creationId xmlns:p14="http://schemas.microsoft.com/office/powerpoint/2010/main" val="1137916481"/>
       </p:ext>
     </p:extLst>
   </p:cSld>

</xml_diff>